<commit_message>
finished lecture 3, started lecture 4
</commit_message>
<xml_diff>
--- a/Lecture3.pptx
+++ b/Lecture3.pptx
@@ -5,32 +5,36 @@
     <p:sldMasterId id="2147483648" r:id="rId1"/>
   </p:sldMasterIdLst>
   <p:notesMasterIdLst>
-    <p:notesMasterId r:id="rId15"/>
+    <p:notesMasterId r:id="rId19"/>
   </p:notesMasterIdLst>
   <p:sldIdLst>
     <p:sldId id="256" r:id="rId2"/>
-    <p:sldId id="257" r:id="rId3"/>
-    <p:sldId id="262" r:id="rId4"/>
-    <p:sldId id="263" r:id="rId5"/>
-    <p:sldId id="264" r:id="rId6"/>
-    <p:sldId id="258" r:id="rId7"/>
-    <p:sldId id="265" r:id="rId8"/>
-    <p:sldId id="269" r:id="rId9"/>
-    <p:sldId id="266" r:id="rId10"/>
-    <p:sldId id="268" r:id="rId11"/>
-    <p:sldId id="259" r:id="rId12"/>
-    <p:sldId id="260" r:id="rId13"/>
-    <p:sldId id="261" r:id="rId14"/>
+    <p:sldId id="270" r:id="rId3"/>
+    <p:sldId id="264" r:id="rId4"/>
+    <p:sldId id="273" r:id="rId5"/>
+    <p:sldId id="272" r:id="rId6"/>
+    <p:sldId id="271" r:id="rId7"/>
+    <p:sldId id="258" r:id="rId8"/>
+    <p:sldId id="265" r:id="rId9"/>
+    <p:sldId id="269" r:id="rId10"/>
+    <p:sldId id="266" r:id="rId11"/>
+    <p:sldId id="268" r:id="rId12"/>
+    <p:sldId id="259" r:id="rId13"/>
+    <p:sldId id="260" r:id="rId14"/>
+    <p:sldId id="261" r:id="rId15"/>
+    <p:sldId id="274" r:id="rId16"/>
+    <p:sldId id="275" r:id="rId17"/>
+    <p:sldId id="276" r:id="rId18"/>
   </p:sldIdLst>
   <p:sldSz cx="12192000" cy="6858000"/>
   <p:notesSz cx="6858000" cy="9144000"/>
   <p:embeddedFontLst>
     <p:embeddedFont>
       <p:font typeface="Century Gothic" panose="020B0502020202020204" pitchFamily="34" charset="0"/>
-      <p:regular r:id="rId16"/>
-      <p:bold r:id="rId17"/>
-      <p:italic r:id="rId18"/>
-      <p:boldItalic r:id="rId19"/>
+      <p:regular r:id="rId20"/>
+      <p:bold r:id="rId21"/>
+      <p:italic r:id="rId22"/>
+      <p:boldItalic r:id="rId23"/>
     </p:embeddedFont>
   </p:embeddedFontLst>
   <p:defaultTextStyle>
@@ -267,7 +271,7 @@
       <p15:sldGuideLst xmlns:p15="http://schemas.microsoft.com/office/powerpoint/2012/main"/>
     </p:ext>
     <p:ext uri="GoogleSlidesCustomDataVersion2">
-      <go:slidesCustomData xmlns:go="http://customooxmlschemas.google.com/" xmlns:ahyp="http://schemas.microsoft.com/office/drawing/2018/hyperlinkcolor" xmlns:p15="http://schemas.microsoft.com/office/powerpoint/2012/main" xmlns:p14="http://schemas.microsoft.com/office/powerpoint/2010/main" xmlns:com="http://schemas.openxmlformats.org/drawingml/2006/compatibility" xmlns:pvml="urn:schemas-microsoft-com:office:powerpoint" xmlns:v="urn:schemas-microsoft-com:vml" xmlns:o="urn:schemas-microsoft-com:office:office" xmlns:dgm="http://schemas.openxmlformats.org/drawingml/2006/diagram" xmlns:c="http://schemas.openxmlformats.org/drawingml/2006/chart" xmlns:mv="urn:schemas-microsoft-com:mac:vml" xmlns:mc="http://schemas.openxmlformats.org/markup-compatibility/2006" xmlns="" r:id="rId38" roundtripDataSignature="AMtx7mhEk3kr15p5MvOwX8Siehu9UxAE2A=="/>
+      <go:slidesCustomData xmlns="" xmlns:mc="http://schemas.openxmlformats.org/markup-compatibility/2006" xmlns:mv="urn:schemas-microsoft-com:mac:vml" xmlns:c="http://schemas.openxmlformats.org/drawingml/2006/chart" xmlns:dgm="http://schemas.openxmlformats.org/drawingml/2006/diagram" xmlns:o="urn:schemas-microsoft-com:office:office" xmlns:v="urn:schemas-microsoft-com:vml" xmlns:pvml="urn:schemas-microsoft-com:office:powerpoint" xmlns:com="http://schemas.openxmlformats.org/drawingml/2006/compatibility" xmlns:p14="http://schemas.microsoft.com/office/powerpoint/2010/main" xmlns:p15="http://schemas.microsoft.com/office/powerpoint/2012/main" xmlns:ahyp="http://schemas.microsoft.com/office/drawing/2018/hyperlinkcolor" xmlns:go="http://customooxmlschemas.google.com/" r:id="rId38" roundtripDataSignature="AMtx7mhEk3kr15p5MvOwX8Siehu9UxAE2A=="/>
     </p:ext>
   </p:extLst>
 </p:presentation>
@@ -1517,7 +1521,11 @@
               </a:spcAft>
               <a:buNone/>
             </a:pPr>
-            <a:endParaRPr/>
+            <a:r>
+              <a:rPr lang="en-US" dirty="0"/>
+              <a:t>PANOPTO!</a:t>
+            </a:r>
+            <a:endParaRPr dirty="0"/>
           </a:p>
         </p:txBody>
       </p:sp>
@@ -1655,7 +1663,7 @@
                 <a:cs typeface="Calibri"/>
                 <a:sym typeface="Calibri"/>
               </a:rPr>
-              <a:t>11</a:t>
+              <a:t>12</a:t>
             </a:fld>
             <a:endParaRPr lang="en-US" sz="1200" b="0" i="0" u="none" strike="noStrike" cap="none">
               <a:solidFill>
@@ -1683,364 +1691,6 @@
 </file>
 
 <file path=ppt/notesSlides/notesSlide2.xml><?xml version="1.0" encoding="utf-8"?>
-<p:notes xmlns:a="http://schemas.openxmlformats.org/drawingml/2006/main" xmlns:r="http://schemas.openxmlformats.org/officeDocument/2006/relationships" xmlns:p="http://schemas.openxmlformats.org/presentationml/2006/main" showMasterSp="0" showMasterPhAnim="0">
-  <p:cSld>
-    <p:spTree>
-      <p:nvGrpSpPr>
-        <p:cNvPr id="1" name="Shape 170"/>
-        <p:cNvGrpSpPr/>
-        <p:nvPr/>
-      </p:nvGrpSpPr>
-      <p:grpSpPr>
-        <a:xfrm>
-          <a:off x="0" y="0"/>
-          <a:ext cx="0" cy="0"/>
-          <a:chOff x="0" y="0"/>
-          <a:chExt cx="0" cy="0"/>
-        </a:xfrm>
-      </p:grpSpPr>
-      <p:sp>
-        <p:nvSpPr>
-          <p:cNvPr id="171" name="Google Shape;171;p2:notes"/>
-          <p:cNvSpPr txBox="1">
-            <a:spLocks noGrp="1"/>
-          </p:cNvSpPr>
-          <p:nvPr>
-            <p:ph type="body" idx="1"/>
-          </p:nvPr>
-        </p:nvSpPr>
-        <p:spPr>
-          <a:xfrm>
-            <a:off x="685800" y="4400550"/>
-            <a:ext cx="5486400" cy="3600450"/>
-          </a:xfrm>
-          <a:prstGeom prst="rect">
-            <a:avLst/>
-          </a:prstGeom>
-        </p:spPr>
-        <p:txBody>
-          <a:bodyPr spcFirstLastPara="1" wrap="square" lIns="91425" tIns="45700" rIns="91425" bIns="45700" anchor="t" anchorCtr="0">
-            <a:noAutofit/>
-          </a:bodyPr>
-          <a:lstStyle/>
-          <a:p>
-            <a:pPr marL="0" lvl="0" indent="0" algn="l" rtl="0">
-              <a:spcBef>
-                <a:spcPts val="0"/>
-              </a:spcBef>
-              <a:spcAft>
-                <a:spcPts val="0"/>
-              </a:spcAft>
-              <a:buNone/>
-            </a:pPr>
-            <a:endParaRPr/>
-          </a:p>
-        </p:txBody>
-      </p:sp>
-      <p:sp>
-        <p:nvSpPr>
-          <p:cNvPr id="172" name="Google Shape;172;p2:notes"/>
-          <p:cNvSpPr>
-            <a:spLocks noGrp="1" noRot="1" noChangeAspect="1"/>
-          </p:cNvSpPr>
-          <p:nvPr>
-            <p:ph type="sldImg" idx="2"/>
-          </p:nvPr>
-        </p:nvSpPr>
-        <p:spPr>
-          <a:xfrm>
-            <a:off x="685800" y="1143000"/>
-            <a:ext cx="5486400" cy="3086100"/>
-          </a:xfrm>
-          <a:custGeom>
-            <a:avLst/>
-            <a:gdLst/>
-            <a:ahLst/>
-            <a:cxnLst/>
-            <a:rect l="l" t="t" r="r" b="b"/>
-            <a:pathLst>
-              <a:path w="120000" h="120000" extrusionOk="0">
-                <a:moveTo>
-                  <a:pt x="0" y="0"/>
-                </a:moveTo>
-                <a:lnTo>
-                  <a:pt x="120000" y="0"/>
-                </a:lnTo>
-                <a:lnTo>
-                  <a:pt x="120000" y="120000"/>
-                </a:lnTo>
-                <a:lnTo>
-                  <a:pt x="0" y="120000"/>
-                </a:lnTo>
-                <a:close/>
-              </a:path>
-            </a:pathLst>
-          </a:custGeom>
-        </p:spPr>
-      </p:sp>
-    </p:spTree>
-  </p:cSld>
-  <p:clrMapOvr>
-    <a:masterClrMapping/>
-  </p:clrMapOvr>
-</p:notes>
-</file>
-
-<file path=ppt/notesSlides/notesSlide3.xml><?xml version="1.0" encoding="utf-8"?>
-<p:notes xmlns:a="http://schemas.openxmlformats.org/drawingml/2006/main" xmlns:r="http://schemas.openxmlformats.org/officeDocument/2006/relationships" xmlns:p="http://schemas.openxmlformats.org/presentationml/2006/main" showMasterSp="0" showMasterPhAnim="0">
-  <p:cSld>
-    <p:spTree>
-      <p:nvGrpSpPr>
-        <p:cNvPr id="1" name="Shape 170">
-          <a:extLst>
-            <a:ext uri="{FF2B5EF4-FFF2-40B4-BE49-F238E27FC236}">
-              <a16:creationId xmlns:a16="http://schemas.microsoft.com/office/drawing/2014/main" id="{A3BD0EFD-F42A-46F5-E3B1-D7196CB0F350}"/>
-            </a:ext>
-          </a:extLst>
-        </p:cNvPr>
-        <p:cNvGrpSpPr/>
-        <p:nvPr/>
-      </p:nvGrpSpPr>
-      <p:grpSpPr>
-        <a:xfrm>
-          <a:off x="0" y="0"/>
-          <a:ext cx="0" cy="0"/>
-          <a:chOff x="0" y="0"/>
-          <a:chExt cx="0" cy="0"/>
-        </a:xfrm>
-      </p:grpSpPr>
-      <p:sp>
-        <p:nvSpPr>
-          <p:cNvPr id="171" name="Google Shape;171;p2:notes">
-            <a:extLst>
-              <a:ext uri="{FF2B5EF4-FFF2-40B4-BE49-F238E27FC236}">
-                <a16:creationId xmlns:a16="http://schemas.microsoft.com/office/drawing/2014/main" id="{0CB4969D-45D0-7932-4665-0BDAEE45C4D7}"/>
-              </a:ext>
-            </a:extLst>
-          </p:cNvPr>
-          <p:cNvSpPr txBox="1">
-            <a:spLocks noGrp="1"/>
-          </p:cNvSpPr>
-          <p:nvPr>
-            <p:ph type="body" idx="1"/>
-          </p:nvPr>
-        </p:nvSpPr>
-        <p:spPr>
-          <a:xfrm>
-            <a:off x="685800" y="4400550"/>
-            <a:ext cx="5486400" cy="3600450"/>
-          </a:xfrm>
-          <a:prstGeom prst="rect">
-            <a:avLst/>
-          </a:prstGeom>
-        </p:spPr>
-        <p:txBody>
-          <a:bodyPr spcFirstLastPara="1" wrap="square" lIns="91425" tIns="45700" rIns="91425" bIns="45700" anchor="t" anchorCtr="0">
-            <a:noAutofit/>
-          </a:bodyPr>
-          <a:lstStyle/>
-          <a:p>
-            <a:pPr marL="0" lvl="0" indent="0" algn="l" rtl="0">
-              <a:spcBef>
-                <a:spcPts val="0"/>
-              </a:spcBef>
-              <a:spcAft>
-                <a:spcPts val="0"/>
-              </a:spcAft>
-              <a:buNone/>
-            </a:pPr>
-            <a:endParaRPr/>
-          </a:p>
-        </p:txBody>
-      </p:sp>
-      <p:sp>
-        <p:nvSpPr>
-          <p:cNvPr id="172" name="Google Shape;172;p2:notes">
-            <a:extLst>
-              <a:ext uri="{FF2B5EF4-FFF2-40B4-BE49-F238E27FC236}">
-                <a16:creationId xmlns:a16="http://schemas.microsoft.com/office/drawing/2014/main" id="{711988FF-D5F6-A8EF-F2C7-2C69C7644C95}"/>
-              </a:ext>
-            </a:extLst>
-          </p:cNvPr>
-          <p:cNvSpPr>
-            <a:spLocks noGrp="1" noRot="1" noChangeAspect="1"/>
-          </p:cNvSpPr>
-          <p:nvPr>
-            <p:ph type="sldImg" idx="2"/>
-          </p:nvPr>
-        </p:nvSpPr>
-        <p:spPr>
-          <a:xfrm>
-            <a:off x="685800" y="1143000"/>
-            <a:ext cx="5486400" cy="3086100"/>
-          </a:xfrm>
-          <a:custGeom>
-            <a:avLst/>
-            <a:gdLst/>
-            <a:ahLst/>
-            <a:cxnLst/>
-            <a:rect l="l" t="t" r="r" b="b"/>
-            <a:pathLst>
-              <a:path w="120000" h="120000" extrusionOk="0">
-                <a:moveTo>
-                  <a:pt x="0" y="0"/>
-                </a:moveTo>
-                <a:lnTo>
-                  <a:pt x="120000" y="0"/>
-                </a:lnTo>
-                <a:lnTo>
-                  <a:pt x="120000" y="120000"/>
-                </a:lnTo>
-                <a:lnTo>
-                  <a:pt x="0" y="120000"/>
-                </a:lnTo>
-                <a:close/>
-              </a:path>
-            </a:pathLst>
-          </a:custGeom>
-        </p:spPr>
-      </p:sp>
-    </p:spTree>
-    <p:extLst>
-      <p:ext uri="{BB962C8B-B14F-4D97-AF65-F5344CB8AC3E}">
-        <p14:creationId xmlns:p14="http://schemas.microsoft.com/office/powerpoint/2010/main" val="1512313583"/>
-      </p:ext>
-    </p:extLst>
-  </p:cSld>
-  <p:clrMapOvr>
-    <a:masterClrMapping/>
-  </p:clrMapOvr>
-</p:notes>
-</file>
-
-<file path=ppt/notesSlides/notesSlide4.xml><?xml version="1.0" encoding="utf-8"?>
-<p:notes xmlns:a="http://schemas.openxmlformats.org/drawingml/2006/main" xmlns:r="http://schemas.openxmlformats.org/officeDocument/2006/relationships" xmlns:p="http://schemas.openxmlformats.org/presentationml/2006/main" showMasterSp="0" showMasterPhAnim="0">
-  <p:cSld>
-    <p:spTree>
-      <p:nvGrpSpPr>
-        <p:cNvPr id="1" name="Shape 170">
-          <a:extLst>
-            <a:ext uri="{FF2B5EF4-FFF2-40B4-BE49-F238E27FC236}">
-              <a16:creationId xmlns:a16="http://schemas.microsoft.com/office/drawing/2014/main" id="{BEFA5E00-7718-8E8C-E182-8883FCCCBF3F}"/>
-            </a:ext>
-          </a:extLst>
-        </p:cNvPr>
-        <p:cNvGrpSpPr/>
-        <p:nvPr/>
-      </p:nvGrpSpPr>
-      <p:grpSpPr>
-        <a:xfrm>
-          <a:off x="0" y="0"/>
-          <a:ext cx="0" cy="0"/>
-          <a:chOff x="0" y="0"/>
-          <a:chExt cx="0" cy="0"/>
-        </a:xfrm>
-      </p:grpSpPr>
-      <p:sp>
-        <p:nvSpPr>
-          <p:cNvPr id="171" name="Google Shape;171;p2:notes">
-            <a:extLst>
-              <a:ext uri="{FF2B5EF4-FFF2-40B4-BE49-F238E27FC236}">
-                <a16:creationId xmlns:a16="http://schemas.microsoft.com/office/drawing/2014/main" id="{B65974D8-E4A3-AD50-9DA1-53364B2915F2}"/>
-              </a:ext>
-            </a:extLst>
-          </p:cNvPr>
-          <p:cNvSpPr txBox="1">
-            <a:spLocks noGrp="1"/>
-          </p:cNvSpPr>
-          <p:nvPr>
-            <p:ph type="body" idx="1"/>
-          </p:nvPr>
-        </p:nvSpPr>
-        <p:spPr>
-          <a:xfrm>
-            <a:off x="685800" y="4400550"/>
-            <a:ext cx="5486400" cy="3600450"/>
-          </a:xfrm>
-          <a:prstGeom prst="rect">
-            <a:avLst/>
-          </a:prstGeom>
-        </p:spPr>
-        <p:txBody>
-          <a:bodyPr spcFirstLastPara="1" wrap="square" lIns="91425" tIns="45700" rIns="91425" bIns="45700" anchor="t" anchorCtr="0">
-            <a:noAutofit/>
-          </a:bodyPr>
-          <a:lstStyle/>
-          <a:p>
-            <a:pPr marL="0" lvl="0" indent="0" algn="l" rtl="0">
-              <a:spcBef>
-                <a:spcPts val="0"/>
-              </a:spcBef>
-              <a:spcAft>
-                <a:spcPts val="0"/>
-              </a:spcAft>
-              <a:buNone/>
-            </a:pPr>
-            <a:endParaRPr/>
-          </a:p>
-        </p:txBody>
-      </p:sp>
-      <p:sp>
-        <p:nvSpPr>
-          <p:cNvPr id="172" name="Google Shape;172;p2:notes">
-            <a:extLst>
-              <a:ext uri="{FF2B5EF4-FFF2-40B4-BE49-F238E27FC236}">
-                <a16:creationId xmlns:a16="http://schemas.microsoft.com/office/drawing/2014/main" id="{D041F70A-FC66-EC30-FD60-934DFAA180AD}"/>
-              </a:ext>
-            </a:extLst>
-          </p:cNvPr>
-          <p:cNvSpPr>
-            <a:spLocks noGrp="1" noRot="1" noChangeAspect="1"/>
-          </p:cNvSpPr>
-          <p:nvPr>
-            <p:ph type="sldImg" idx="2"/>
-          </p:nvPr>
-        </p:nvSpPr>
-        <p:spPr>
-          <a:xfrm>
-            <a:off x="685800" y="1143000"/>
-            <a:ext cx="5486400" cy="3086100"/>
-          </a:xfrm>
-          <a:custGeom>
-            <a:avLst/>
-            <a:gdLst/>
-            <a:ahLst/>
-            <a:cxnLst/>
-            <a:rect l="l" t="t" r="r" b="b"/>
-            <a:pathLst>
-              <a:path w="120000" h="120000" extrusionOk="0">
-                <a:moveTo>
-                  <a:pt x="0" y="0"/>
-                </a:moveTo>
-                <a:lnTo>
-                  <a:pt x="120000" y="0"/>
-                </a:lnTo>
-                <a:lnTo>
-                  <a:pt x="120000" y="120000"/>
-                </a:lnTo>
-                <a:lnTo>
-                  <a:pt x="0" y="120000"/>
-                </a:lnTo>
-                <a:close/>
-              </a:path>
-            </a:pathLst>
-          </a:custGeom>
-        </p:spPr>
-      </p:sp>
-    </p:spTree>
-    <p:extLst>
-      <p:ext uri="{BB962C8B-B14F-4D97-AF65-F5344CB8AC3E}">
-        <p14:creationId xmlns:p14="http://schemas.microsoft.com/office/powerpoint/2010/main" val="1641706995"/>
-      </p:ext>
-    </p:extLst>
-  </p:cSld>
-  <p:clrMapOvr>
-    <a:masterClrMapping/>
-  </p:clrMapOvr>
-</p:notes>
-</file>
-
-<file path=ppt/notesSlides/notesSlide5.xml><?xml version="1.0" encoding="utf-8"?>
 <p:notes xmlns:a="http://schemas.openxmlformats.org/drawingml/2006/main" xmlns:r="http://schemas.openxmlformats.org/officeDocument/2006/relationships" xmlns:p="http://schemas.openxmlformats.org/presentationml/2006/main" showMasterSp="0" showMasterPhAnim="0">
   <p:cSld>
     <p:spTree>
@@ -2167,6 +1817,387 @@
 </p:notes>
 </file>
 
+<file path=ppt/notesSlides/notesSlide3.xml><?xml version="1.0" encoding="utf-8"?>
+<p:notes xmlns:a="http://schemas.openxmlformats.org/drawingml/2006/main" xmlns:r="http://schemas.openxmlformats.org/officeDocument/2006/relationships" xmlns:p="http://schemas.openxmlformats.org/presentationml/2006/main" showMasterSp="0" showMasterPhAnim="0">
+  <p:cSld>
+    <p:spTree>
+      <p:nvGrpSpPr>
+        <p:cNvPr id="1" name="Shape 170">
+          <a:extLst>
+            <a:ext uri="{FF2B5EF4-FFF2-40B4-BE49-F238E27FC236}">
+              <a16:creationId xmlns:a16="http://schemas.microsoft.com/office/drawing/2014/main" id="{B029D51C-0F4C-5549-7656-4EA420B765D8}"/>
+            </a:ext>
+          </a:extLst>
+        </p:cNvPr>
+        <p:cNvGrpSpPr/>
+        <p:nvPr/>
+      </p:nvGrpSpPr>
+      <p:grpSpPr>
+        <a:xfrm>
+          <a:off x="0" y="0"/>
+          <a:ext cx="0" cy="0"/>
+          <a:chOff x="0" y="0"/>
+          <a:chExt cx="0" cy="0"/>
+        </a:xfrm>
+      </p:grpSpPr>
+      <p:sp>
+        <p:nvSpPr>
+          <p:cNvPr id="171" name="Google Shape;171;p2:notes">
+            <a:extLst>
+              <a:ext uri="{FF2B5EF4-FFF2-40B4-BE49-F238E27FC236}">
+                <a16:creationId xmlns:a16="http://schemas.microsoft.com/office/drawing/2014/main" id="{DDF9FC33-1D01-1D0A-A724-E5DC7CA3B342}"/>
+              </a:ext>
+            </a:extLst>
+          </p:cNvPr>
+          <p:cNvSpPr txBox="1">
+            <a:spLocks noGrp="1"/>
+          </p:cNvSpPr>
+          <p:nvPr>
+            <p:ph type="body" idx="1"/>
+          </p:nvPr>
+        </p:nvSpPr>
+        <p:spPr>
+          <a:xfrm>
+            <a:off x="685800" y="4400550"/>
+            <a:ext cx="5486400" cy="3600450"/>
+          </a:xfrm>
+          <a:prstGeom prst="rect">
+            <a:avLst/>
+          </a:prstGeom>
+        </p:spPr>
+        <p:txBody>
+          <a:bodyPr spcFirstLastPara="1" wrap="square" lIns="91425" tIns="45700" rIns="91425" bIns="45700" anchor="t" anchorCtr="0">
+            <a:noAutofit/>
+          </a:bodyPr>
+          <a:lstStyle/>
+          <a:p>
+            <a:pPr marL="0" lvl="0" indent="0" algn="l" rtl="0">
+              <a:spcBef>
+                <a:spcPts val="0"/>
+              </a:spcBef>
+              <a:spcAft>
+                <a:spcPts val="0"/>
+              </a:spcAft>
+              <a:buNone/>
+            </a:pPr>
+            <a:endParaRPr/>
+          </a:p>
+        </p:txBody>
+      </p:sp>
+      <p:sp>
+        <p:nvSpPr>
+          <p:cNvPr id="172" name="Google Shape;172;p2:notes">
+            <a:extLst>
+              <a:ext uri="{FF2B5EF4-FFF2-40B4-BE49-F238E27FC236}">
+                <a16:creationId xmlns:a16="http://schemas.microsoft.com/office/drawing/2014/main" id="{BB319A0D-D3BD-C1D8-95F8-332596FE1D3C}"/>
+              </a:ext>
+            </a:extLst>
+          </p:cNvPr>
+          <p:cNvSpPr>
+            <a:spLocks noGrp="1" noRot="1" noChangeAspect="1"/>
+          </p:cNvSpPr>
+          <p:nvPr>
+            <p:ph type="sldImg" idx="2"/>
+          </p:nvPr>
+        </p:nvSpPr>
+        <p:spPr>
+          <a:xfrm>
+            <a:off x="685800" y="1143000"/>
+            <a:ext cx="5486400" cy="3086100"/>
+          </a:xfrm>
+          <a:custGeom>
+            <a:avLst/>
+            <a:gdLst/>
+            <a:ahLst/>
+            <a:cxnLst/>
+            <a:rect l="l" t="t" r="r" b="b"/>
+            <a:pathLst>
+              <a:path w="120000" h="120000" extrusionOk="0">
+                <a:moveTo>
+                  <a:pt x="0" y="0"/>
+                </a:moveTo>
+                <a:lnTo>
+                  <a:pt x="120000" y="0"/>
+                </a:lnTo>
+                <a:lnTo>
+                  <a:pt x="120000" y="120000"/>
+                </a:lnTo>
+                <a:lnTo>
+                  <a:pt x="0" y="120000"/>
+                </a:lnTo>
+                <a:close/>
+              </a:path>
+            </a:pathLst>
+          </a:custGeom>
+        </p:spPr>
+      </p:sp>
+    </p:spTree>
+    <p:extLst>
+      <p:ext uri="{BB962C8B-B14F-4D97-AF65-F5344CB8AC3E}">
+        <p14:creationId xmlns:p14="http://schemas.microsoft.com/office/powerpoint/2010/main" val="368086772"/>
+      </p:ext>
+    </p:extLst>
+  </p:cSld>
+  <p:clrMapOvr>
+    <a:masterClrMapping/>
+  </p:clrMapOvr>
+</p:notes>
+</file>
+
+<file path=ppt/notesSlides/notesSlide4.xml><?xml version="1.0" encoding="utf-8"?>
+<p:notes xmlns:a="http://schemas.openxmlformats.org/drawingml/2006/main" xmlns:r="http://schemas.openxmlformats.org/officeDocument/2006/relationships" xmlns:p="http://schemas.openxmlformats.org/presentationml/2006/main" showMasterSp="0" showMasterPhAnim="0">
+  <p:cSld>
+    <p:spTree>
+      <p:nvGrpSpPr>
+        <p:cNvPr id="1" name="Shape 170">
+          <a:extLst>
+            <a:ext uri="{FF2B5EF4-FFF2-40B4-BE49-F238E27FC236}">
+              <a16:creationId xmlns:a16="http://schemas.microsoft.com/office/drawing/2014/main" id="{1AF36DF2-CA70-262C-51DC-77B110B90818}"/>
+            </a:ext>
+          </a:extLst>
+        </p:cNvPr>
+        <p:cNvGrpSpPr/>
+        <p:nvPr/>
+      </p:nvGrpSpPr>
+      <p:grpSpPr>
+        <a:xfrm>
+          <a:off x="0" y="0"/>
+          <a:ext cx="0" cy="0"/>
+          <a:chOff x="0" y="0"/>
+          <a:chExt cx="0" cy="0"/>
+        </a:xfrm>
+      </p:grpSpPr>
+      <p:sp>
+        <p:nvSpPr>
+          <p:cNvPr id="171" name="Google Shape;171;p2:notes">
+            <a:extLst>
+              <a:ext uri="{FF2B5EF4-FFF2-40B4-BE49-F238E27FC236}">
+                <a16:creationId xmlns:a16="http://schemas.microsoft.com/office/drawing/2014/main" id="{EF0C3DBC-ECCB-1D61-E87E-83161FAF2D20}"/>
+              </a:ext>
+            </a:extLst>
+          </p:cNvPr>
+          <p:cNvSpPr txBox="1">
+            <a:spLocks noGrp="1"/>
+          </p:cNvSpPr>
+          <p:nvPr>
+            <p:ph type="body" idx="1"/>
+          </p:nvPr>
+        </p:nvSpPr>
+        <p:spPr>
+          <a:xfrm>
+            <a:off x="685800" y="4400550"/>
+            <a:ext cx="5486400" cy="3600450"/>
+          </a:xfrm>
+          <a:prstGeom prst="rect">
+            <a:avLst/>
+          </a:prstGeom>
+        </p:spPr>
+        <p:txBody>
+          <a:bodyPr spcFirstLastPara="1" wrap="square" lIns="91425" tIns="45700" rIns="91425" bIns="45700" anchor="t" anchorCtr="0">
+            <a:noAutofit/>
+          </a:bodyPr>
+          <a:lstStyle/>
+          <a:p>
+            <a:pPr marL="0" lvl="0" indent="0" algn="l" rtl="0">
+              <a:spcBef>
+                <a:spcPts val="0"/>
+              </a:spcBef>
+              <a:spcAft>
+                <a:spcPts val="0"/>
+              </a:spcAft>
+              <a:buNone/>
+            </a:pPr>
+            <a:endParaRPr/>
+          </a:p>
+        </p:txBody>
+      </p:sp>
+      <p:sp>
+        <p:nvSpPr>
+          <p:cNvPr id="172" name="Google Shape;172;p2:notes">
+            <a:extLst>
+              <a:ext uri="{FF2B5EF4-FFF2-40B4-BE49-F238E27FC236}">
+                <a16:creationId xmlns:a16="http://schemas.microsoft.com/office/drawing/2014/main" id="{F2158B8B-4295-606B-6EEE-09BBC431AA8F}"/>
+              </a:ext>
+            </a:extLst>
+          </p:cNvPr>
+          <p:cNvSpPr>
+            <a:spLocks noGrp="1" noRot="1" noChangeAspect="1"/>
+          </p:cNvSpPr>
+          <p:nvPr>
+            <p:ph type="sldImg" idx="2"/>
+          </p:nvPr>
+        </p:nvSpPr>
+        <p:spPr>
+          <a:xfrm>
+            <a:off x="685800" y="1143000"/>
+            <a:ext cx="5486400" cy="3086100"/>
+          </a:xfrm>
+          <a:custGeom>
+            <a:avLst/>
+            <a:gdLst/>
+            <a:ahLst/>
+            <a:cxnLst/>
+            <a:rect l="l" t="t" r="r" b="b"/>
+            <a:pathLst>
+              <a:path w="120000" h="120000" extrusionOk="0">
+                <a:moveTo>
+                  <a:pt x="0" y="0"/>
+                </a:moveTo>
+                <a:lnTo>
+                  <a:pt x="120000" y="0"/>
+                </a:lnTo>
+                <a:lnTo>
+                  <a:pt x="120000" y="120000"/>
+                </a:lnTo>
+                <a:lnTo>
+                  <a:pt x="0" y="120000"/>
+                </a:lnTo>
+                <a:close/>
+              </a:path>
+            </a:pathLst>
+          </a:custGeom>
+        </p:spPr>
+      </p:sp>
+    </p:spTree>
+    <p:extLst>
+      <p:ext uri="{BB962C8B-B14F-4D97-AF65-F5344CB8AC3E}">
+        <p14:creationId xmlns:p14="http://schemas.microsoft.com/office/powerpoint/2010/main" val="2768947394"/>
+      </p:ext>
+    </p:extLst>
+  </p:cSld>
+  <p:clrMapOvr>
+    <a:masterClrMapping/>
+  </p:clrMapOvr>
+</p:notes>
+</file>
+
+<file path=ppt/notesSlides/notesSlide5.xml><?xml version="1.0" encoding="utf-8"?>
+<p:notes xmlns:a="http://schemas.openxmlformats.org/drawingml/2006/main" xmlns:r="http://schemas.openxmlformats.org/officeDocument/2006/relationships" xmlns:p="http://schemas.openxmlformats.org/presentationml/2006/main" showMasterSp="0" showMasterPhAnim="0">
+  <p:cSld>
+    <p:spTree>
+      <p:nvGrpSpPr>
+        <p:cNvPr id="1" name="Shape 170">
+          <a:extLst>
+            <a:ext uri="{FF2B5EF4-FFF2-40B4-BE49-F238E27FC236}">
+              <a16:creationId xmlns:a16="http://schemas.microsoft.com/office/drawing/2014/main" id="{5DFC6A12-8504-E391-7704-F44D942D510A}"/>
+            </a:ext>
+          </a:extLst>
+        </p:cNvPr>
+        <p:cNvGrpSpPr/>
+        <p:nvPr/>
+      </p:nvGrpSpPr>
+      <p:grpSpPr>
+        <a:xfrm>
+          <a:off x="0" y="0"/>
+          <a:ext cx="0" cy="0"/>
+          <a:chOff x="0" y="0"/>
+          <a:chExt cx="0" cy="0"/>
+        </a:xfrm>
+      </p:grpSpPr>
+      <p:sp>
+        <p:nvSpPr>
+          <p:cNvPr id="171" name="Google Shape;171;p2:notes">
+            <a:extLst>
+              <a:ext uri="{FF2B5EF4-FFF2-40B4-BE49-F238E27FC236}">
+                <a16:creationId xmlns:a16="http://schemas.microsoft.com/office/drawing/2014/main" id="{651F713A-C74B-6051-36B7-A31F6BD3E22E}"/>
+              </a:ext>
+            </a:extLst>
+          </p:cNvPr>
+          <p:cNvSpPr txBox="1">
+            <a:spLocks noGrp="1"/>
+          </p:cNvSpPr>
+          <p:nvPr>
+            <p:ph type="body" idx="1"/>
+          </p:nvPr>
+        </p:nvSpPr>
+        <p:spPr>
+          <a:xfrm>
+            <a:off x="685800" y="4400550"/>
+            <a:ext cx="5486400" cy="3600450"/>
+          </a:xfrm>
+          <a:prstGeom prst="rect">
+            <a:avLst/>
+          </a:prstGeom>
+        </p:spPr>
+        <p:txBody>
+          <a:bodyPr spcFirstLastPara="1" wrap="square" lIns="91425" tIns="45700" rIns="91425" bIns="45700" anchor="t" anchorCtr="0">
+            <a:noAutofit/>
+          </a:bodyPr>
+          <a:lstStyle/>
+          <a:p>
+            <a:pPr marL="0" lvl="0" indent="0" algn="l" rtl="0">
+              <a:spcBef>
+                <a:spcPts val="0"/>
+              </a:spcBef>
+              <a:spcAft>
+                <a:spcPts val="0"/>
+              </a:spcAft>
+              <a:buNone/>
+            </a:pPr>
+            <a:endParaRPr/>
+          </a:p>
+        </p:txBody>
+      </p:sp>
+      <p:sp>
+        <p:nvSpPr>
+          <p:cNvPr id="172" name="Google Shape;172;p2:notes">
+            <a:extLst>
+              <a:ext uri="{FF2B5EF4-FFF2-40B4-BE49-F238E27FC236}">
+                <a16:creationId xmlns:a16="http://schemas.microsoft.com/office/drawing/2014/main" id="{B80B0437-162B-B123-7E71-3D6FCA76D3B6}"/>
+              </a:ext>
+            </a:extLst>
+          </p:cNvPr>
+          <p:cNvSpPr>
+            <a:spLocks noGrp="1" noRot="1" noChangeAspect="1"/>
+          </p:cNvSpPr>
+          <p:nvPr>
+            <p:ph type="sldImg" idx="2"/>
+          </p:nvPr>
+        </p:nvSpPr>
+        <p:spPr>
+          <a:xfrm>
+            <a:off x="685800" y="1143000"/>
+            <a:ext cx="5486400" cy="3086100"/>
+          </a:xfrm>
+          <a:custGeom>
+            <a:avLst/>
+            <a:gdLst/>
+            <a:ahLst/>
+            <a:cxnLst/>
+            <a:rect l="l" t="t" r="r" b="b"/>
+            <a:pathLst>
+              <a:path w="120000" h="120000" extrusionOk="0">
+                <a:moveTo>
+                  <a:pt x="0" y="0"/>
+                </a:moveTo>
+                <a:lnTo>
+                  <a:pt x="120000" y="0"/>
+                </a:lnTo>
+                <a:lnTo>
+                  <a:pt x="120000" y="120000"/>
+                </a:lnTo>
+                <a:lnTo>
+                  <a:pt x="0" y="120000"/>
+                </a:lnTo>
+                <a:close/>
+              </a:path>
+            </a:pathLst>
+          </a:custGeom>
+        </p:spPr>
+      </p:sp>
+    </p:spTree>
+    <p:extLst>
+      <p:ext uri="{BB962C8B-B14F-4D97-AF65-F5344CB8AC3E}">
+        <p14:creationId xmlns:p14="http://schemas.microsoft.com/office/powerpoint/2010/main" val="764237665"/>
+      </p:ext>
+    </p:extLst>
+  </p:cSld>
+  <p:clrMapOvr>
+    <a:masterClrMapping/>
+  </p:clrMapOvr>
+</p:notes>
+</file>
+
 <file path=ppt/notesSlides/notesSlide6.xml><?xml version="1.0" encoding="utf-8"?>
 <p:notes xmlns:a="http://schemas.openxmlformats.org/drawingml/2006/main" xmlns:r="http://schemas.openxmlformats.org/officeDocument/2006/relationships" xmlns:p="http://schemas.openxmlformats.org/presentationml/2006/main">
   <p:cSld>
@@ -2252,7 +2283,7 @@
                 <a:cs typeface="Calibri"/>
                 <a:sym typeface="Calibri"/>
               </a:rPr>
-              <a:t>7</a:t>
+              <a:t>8</a:t>
             </a:fld>
             <a:endParaRPr lang="en-US" sz="1200" b="0" i="0" u="none" strike="noStrike" cap="none">
               <a:solidFill>
@@ -2388,7 +2419,7 @@
                 <a:cs typeface="Calibri"/>
                 <a:sym typeface="Calibri"/>
               </a:rPr>
-              <a:t>8</a:t>
+              <a:t>9</a:t>
             </a:fld>
             <a:endParaRPr lang="en-US" sz="1200" b="0" i="0" u="none" strike="noStrike" cap="none">
               <a:solidFill>
@@ -2500,7 +2531,7 @@
                 <a:cs typeface="Calibri"/>
                 <a:sym typeface="Calibri"/>
               </a:rPr>
-              <a:t>9</a:t>
+              <a:t>10</a:t>
             </a:fld>
             <a:endParaRPr lang="en-US" sz="1200" b="0" i="0" u="none" strike="noStrike" cap="none">
               <a:solidFill>
@@ -2653,7 +2684,7 @@
                 <a:cs typeface="Calibri"/>
                 <a:sym typeface="Calibri"/>
               </a:rPr>
-              <a:t>10</a:t>
+              <a:t>11</a:t>
             </a:fld>
             <a:endParaRPr lang="en-US" sz="1200" b="0" i="0" u="none" strike="noStrike" cap="none">
               <a:solidFill>
@@ -20244,6 +20275,127 @@
   <p:cSld>
     <p:spTree>
       <p:nvGrpSpPr>
+        <p:cNvPr id="1" name=""/>
+        <p:cNvGrpSpPr/>
+        <p:nvPr/>
+      </p:nvGrpSpPr>
+      <p:grpSpPr>
+        <a:xfrm>
+          <a:off x="0" y="0"/>
+          <a:ext cx="0" cy="0"/>
+          <a:chOff x="0" y="0"/>
+          <a:chExt cx="0" cy="0"/>
+        </a:xfrm>
+      </p:grpSpPr>
+      <p:sp>
+        <p:nvSpPr>
+          <p:cNvPr id="2" name="Title 1">
+            <a:extLst>
+              <a:ext uri="{FF2B5EF4-FFF2-40B4-BE49-F238E27FC236}">
+                <a16:creationId xmlns:a16="http://schemas.microsoft.com/office/drawing/2014/main" id="{BCBF3ABE-1301-6EAC-8950-77F811CF9B71}"/>
+              </a:ext>
+            </a:extLst>
+          </p:cNvPr>
+          <p:cNvSpPr>
+            <a:spLocks noGrp="1"/>
+          </p:cNvSpPr>
+          <p:nvPr>
+            <p:ph type="title"/>
+          </p:nvPr>
+        </p:nvSpPr>
+        <p:spPr/>
+        <p:txBody>
+          <a:bodyPr/>
+          <a:lstStyle/>
+          <a:p>
+            <a:r>
+              <a:rPr lang="en-US" dirty="0"/>
+              <a:t>Two sample t test</a:t>
+            </a:r>
+          </a:p>
+        </p:txBody>
+      </p:sp>
+      <p:sp>
+        <p:nvSpPr>
+          <p:cNvPr id="3" name="Text Placeholder 2">
+            <a:extLst>
+              <a:ext uri="{FF2B5EF4-FFF2-40B4-BE49-F238E27FC236}">
+                <a16:creationId xmlns:a16="http://schemas.microsoft.com/office/drawing/2014/main" id="{41A023D3-AEAA-E555-C53A-4185A3198826}"/>
+              </a:ext>
+            </a:extLst>
+          </p:cNvPr>
+          <p:cNvSpPr>
+            <a:spLocks noGrp="1"/>
+          </p:cNvSpPr>
+          <p:nvPr>
+            <p:ph type="body" idx="1"/>
+          </p:nvPr>
+        </p:nvSpPr>
+        <p:spPr>
+          <a:xfrm>
+            <a:off x="1674812" y="2133600"/>
+            <a:ext cx="4645392" cy="3777622"/>
+          </a:xfrm>
+        </p:spPr>
+        <p:txBody>
+          <a:bodyPr/>
+          <a:lstStyle/>
+          <a:p>
+            <a:r>
+              <a:rPr lang="en-US" dirty="0"/>
+              <a:t>Are these samples different from each other?</a:t>
+            </a:r>
+          </a:p>
+        </p:txBody>
+      </p:sp>
+      <p:pic>
+        <p:nvPicPr>
+          <p:cNvPr id="5" name="Picture 4">
+            <a:extLst>
+              <a:ext uri="{FF2B5EF4-FFF2-40B4-BE49-F238E27FC236}">
+                <a16:creationId xmlns:a16="http://schemas.microsoft.com/office/drawing/2014/main" id="{135FCF47-C2A7-B45F-9A9F-A19C85E8887D}"/>
+              </a:ext>
+            </a:extLst>
+          </p:cNvPr>
+          <p:cNvPicPr>
+            <a:picLocks noChangeAspect="1"/>
+          </p:cNvPicPr>
+          <p:nvPr/>
+        </p:nvPicPr>
+        <p:blipFill>
+          <a:blip r:embed="rId3"/>
+          <a:stretch>
+            <a:fillRect/>
+          </a:stretch>
+        </p:blipFill>
+        <p:spPr>
+          <a:xfrm>
+            <a:off x="6458552" y="1517851"/>
+            <a:ext cx="5733448" cy="3822298"/>
+          </a:xfrm>
+          <a:prstGeom prst="rect">
+            <a:avLst/>
+          </a:prstGeom>
+        </p:spPr>
+      </p:pic>
+    </p:spTree>
+    <p:extLst>
+      <p:ext uri="{BB962C8B-B14F-4D97-AF65-F5344CB8AC3E}">
+        <p14:creationId xmlns:p14="http://schemas.microsoft.com/office/powerpoint/2010/main" val="1185076480"/>
+      </p:ext>
+    </p:extLst>
+  </p:cSld>
+  <p:clrMapOvr>
+    <a:masterClrMapping/>
+  </p:clrMapOvr>
+</p:sld>
+</file>
+
+<file path=ppt/slides/slide11.xml><?xml version="1.0" encoding="utf-8"?>
+<p:sld xmlns:a="http://schemas.openxmlformats.org/drawingml/2006/main" xmlns:r="http://schemas.openxmlformats.org/officeDocument/2006/relationships" xmlns:p="http://schemas.openxmlformats.org/presentationml/2006/main">
+  <p:cSld>
+    <p:spTree>
+      <p:nvGrpSpPr>
         <p:cNvPr id="1" name="">
           <a:extLst>
             <a:ext uri="{FF2B5EF4-FFF2-40B4-BE49-F238E27FC236}">
@@ -20372,7 +20524,7 @@
 </p:sld>
 </file>
 
-<file path=ppt/slides/slide11.xml><?xml version="1.0" encoding="utf-8"?>
+<file path=ppt/slides/slide12.xml><?xml version="1.0" encoding="utf-8"?>
 <p:sld xmlns:a="http://schemas.openxmlformats.org/drawingml/2006/main" xmlns:r="http://schemas.openxmlformats.org/officeDocument/2006/relationships" xmlns:p="http://schemas.openxmlformats.org/presentationml/2006/main">
   <p:cSld>
     <p:spTree>
@@ -20499,7 +20651,7 @@
 </p:sld>
 </file>
 
-<file path=ppt/slides/slide12.xml><?xml version="1.0" encoding="utf-8"?>
+<file path=ppt/slides/slide13.xml><?xml version="1.0" encoding="utf-8"?>
 <p:sld xmlns:a="http://schemas.openxmlformats.org/drawingml/2006/main" xmlns:r="http://schemas.openxmlformats.org/officeDocument/2006/relationships" xmlns:p="http://schemas.openxmlformats.org/presentationml/2006/main">
   <p:cSld>
     <p:spTree>
@@ -20587,6 +20739,30 @@
             <a:r>
               <a:rPr lang="en-US" dirty="0"/>
               <a:t>!</a:t>
+            </a:r>
+          </a:p>
+          <a:p>
+            <a:r>
+              <a:rPr lang="en-US" dirty="0"/>
+              <a:t>Assumes linear relationship</a:t>
+            </a:r>
+          </a:p>
+          <a:p>
+            <a:r>
+              <a:rPr lang="en-US" dirty="0"/>
+              <a:t>Assumes normal residuals</a:t>
+            </a:r>
+          </a:p>
+          <a:p>
+            <a:r>
+              <a:rPr lang="en-US" dirty="0"/>
+              <a:t>Assumes independence</a:t>
+            </a:r>
+          </a:p>
+          <a:p>
+            <a:r>
+              <a:rPr lang="en-US" dirty="0"/>
+              <a:t>Assumes normality (for any x normal distribution of y)</a:t>
             </a:r>
           </a:p>
         </p:txBody>
@@ -20634,7 +20810,7 @@
 </p:sld>
 </file>
 
-<file path=ppt/slides/slide13.xml><?xml version="1.0" encoding="utf-8"?>
+<file path=ppt/slides/slide14.xml><?xml version="1.0" encoding="utf-8"?>
 <p:sld xmlns:a="http://schemas.openxmlformats.org/drawingml/2006/main" xmlns:r="http://schemas.openxmlformats.org/officeDocument/2006/relationships" xmlns:p="http://schemas.openxmlformats.org/presentationml/2006/main">
   <p:cSld>
     <p:spTree>
@@ -20674,7 +20850,7 @@
           <a:p>
             <a:r>
               <a:rPr lang="en-US" dirty="0"/>
-              <a:t>Pearson Rank Correlation</a:t>
+              <a:t>Pearson Correlation</a:t>
             </a:r>
           </a:p>
         </p:txBody>
@@ -20712,6 +20888,40 @@
               <a:t>When do we use each?</a:t>
             </a:r>
           </a:p>
+          <a:p>
+            <a:r>
+              <a:rPr lang="en-US" dirty="0"/>
+              <a:t>Assumptions of Correlations:</a:t>
+            </a:r>
+          </a:p>
+          <a:p>
+            <a:pPr lvl="1"/>
+            <a:r>
+              <a:rPr lang="en-US" dirty="0"/>
+              <a:t>Both variables are continuous</a:t>
+            </a:r>
+          </a:p>
+          <a:p>
+            <a:pPr lvl="1"/>
+            <a:r>
+              <a:rPr lang="en-US" dirty="0"/>
+              <a:t>Each ‘individual’ is in both x and y</a:t>
+            </a:r>
+          </a:p>
+          <a:p>
+            <a:pPr lvl="1"/>
+            <a:r>
+              <a:rPr lang="en-US" dirty="0"/>
+              <a:t>No outliers (this is basically always a breakable assumption!)</a:t>
+            </a:r>
+          </a:p>
+          <a:p>
+            <a:pPr lvl="1"/>
+            <a:r>
+              <a:rPr lang="en-US" dirty="0"/>
+              <a:t>Linear relationship</a:t>
+            </a:r>
+          </a:p>
         </p:txBody>
       </p:sp>
     </p:spTree>
@@ -20727,12 +20937,12 @@
 </p:sld>
 </file>
 
-<file path=ppt/slides/slide2.xml><?xml version="1.0" encoding="utf-8"?>
+<file path=ppt/slides/slide15.xml><?xml version="1.0" encoding="utf-8"?>
 <p:sld xmlns:a="http://schemas.openxmlformats.org/drawingml/2006/main" xmlns:r="http://schemas.openxmlformats.org/officeDocument/2006/relationships" xmlns:p="http://schemas.openxmlformats.org/presentationml/2006/main">
   <p:cSld>
     <p:spTree>
       <p:nvGrpSpPr>
-        <p:cNvPr id="1" name="Shape 173"/>
+        <p:cNvPr id="1" name=""/>
         <p:cNvGrpSpPr/>
         <p:nvPr/>
       </p:nvGrpSpPr>
@@ -20746,154 +20956,63 @@
       </p:grpSpPr>
       <p:sp>
         <p:nvSpPr>
-          <p:cNvPr id="174" name="Google Shape;174;p2"/>
-          <p:cNvSpPr txBox="1">
+          <p:cNvPr id="2" name="Title 1">
+            <a:extLst>
+              <a:ext uri="{FF2B5EF4-FFF2-40B4-BE49-F238E27FC236}">
+                <a16:creationId xmlns:a16="http://schemas.microsoft.com/office/drawing/2014/main" id="{1BD28DBF-B460-1500-7260-70815236DF1E}"/>
+              </a:ext>
+            </a:extLst>
+          </p:cNvPr>
+          <p:cNvSpPr>
             <a:spLocks noGrp="1"/>
           </p:cNvSpPr>
           <p:nvPr>
             <p:ph type="title"/>
           </p:nvPr>
         </p:nvSpPr>
-        <p:spPr>
-          <a:xfrm>
-            <a:off x="2592925" y="624110"/>
-            <a:ext cx="8911687" cy="1280890"/>
-          </a:xfrm>
-          <a:prstGeom prst="rect">
-            <a:avLst/>
-          </a:prstGeom>
-          <a:noFill/>
-          <a:ln>
-            <a:noFill/>
-          </a:ln>
-        </p:spPr>
+        <p:spPr/>
         <p:txBody>
-          <a:bodyPr spcFirstLastPara="1" wrap="square" lIns="91425" tIns="45700" rIns="91425" bIns="45700" anchor="t" anchorCtr="0">
-            <a:normAutofit/>
-          </a:bodyPr>
+          <a:bodyPr/>
           <a:lstStyle/>
           <a:p>
-            <a:pPr marL="0" lvl="0" indent="0" algn="l" rtl="0">
-              <a:spcBef>
-                <a:spcPts val="0"/>
-              </a:spcBef>
-              <a:spcAft>
-                <a:spcPts val="0"/>
-              </a:spcAft>
-              <a:buClr>
-                <a:srgbClr val="262626"/>
-              </a:buClr>
-              <a:buSzPts val="3600"/>
-              <a:buFont typeface="Century Gothic"/>
-              <a:buNone/>
-            </a:pPr>
             <a:r>
               <a:rPr lang="en-US" dirty="0"/>
-              <a:t>Today we’re going to:</a:t>
+              <a:t>COFFEE!!</a:t>
             </a:r>
-            <a:endParaRPr dirty="0"/>
           </a:p>
         </p:txBody>
       </p:sp>
       <p:sp>
         <p:nvSpPr>
-          <p:cNvPr id="175" name="Google Shape;175;p2"/>
-          <p:cNvSpPr txBox="1">
+          <p:cNvPr id="3" name="Text Placeholder 2">
+            <a:extLst>
+              <a:ext uri="{FF2B5EF4-FFF2-40B4-BE49-F238E27FC236}">
+                <a16:creationId xmlns:a16="http://schemas.microsoft.com/office/drawing/2014/main" id="{306AF960-0D89-E0C8-F066-1449197A87DC}"/>
+              </a:ext>
+            </a:extLst>
+          </p:cNvPr>
+          <p:cNvSpPr>
             <a:spLocks noGrp="1"/>
           </p:cNvSpPr>
           <p:nvPr>
             <p:ph type="body" idx="1"/>
           </p:nvPr>
         </p:nvSpPr>
-        <p:spPr>
-          <a:xfrm>
-            <a:off x="2589212" y="2133600"/>
-            <a:ext cx="8915400" cy="1295400"/>
-          </a:xfrm>
-          <a:prstGeom prst="rect">
-            <a:avLst/>
-          </a:prstGeom>
-          <a:noFill/>
-          <a:ln>
-            <a:noFill/>
-          </a:ln>
-        </p:spPr>
+        <p:spPr/>
         <p:txBody>
-          <a:bodyPr spcFirstLastPara="1" wrap="square" lIns="91425" tIns="45700" rIns="91425" bIns="45700" anchor="t" anchorCtr="0">
-            <a:normAutofit lnSpcReduction="10000"/>
-          </a:bodyPr>
+          <a:bodyPr/>
           <a:lstStyle/>
           <a:p>
-            <a:pPr marL="342900" lvl="0" indent="-342900" algn="l" rtl="0">
-              <a:spcBef>
-                <a:spcPts val="0"/>
-              </a:spcBef>
-              <a:spcAft>
-                <a:spcPts val="0"/>
-              </a:spcAft>
-              <a:buSzPts val="1800"/>
-              <a:buChar char="🠶"/>
-            </a:pPr>
-            <a:r>
-              <a:rPr lang="en-US" dirty="0"/>
-              <a:t>Discuss some common, parametric tests</a:t>
-            </a:r>
-          </a:p>
-          <a:p>
-            <a:pPr marL="800100" lvl="1">
-              <a:spcBef>
-                <a:spcPts val="0"/>
-              </a:spcBef>
-            </a:pPr>
-            <a:r>
-              <a:rPr lang="en-US" dirty="0"/>
-              <a:t>t test</a:t>
-            </a:r>
-          </a:p>
-          <a:p>
-            <a:pPr marL="800100" lvl="1">
-              <a:spcBef>
-                <a:spcPts val="0"/>
-              </a:spcBef>
-            </a:pPr>
-            <a:r>
-              <a:rPr lang="en-US" dirty="0"/>
-              <a:t>ANOVA</a:t>
-            </a:r>
-          </a:p>
-          <a:p>
-            <a:pPr marL="800100" lvl="1">
-              <a:spcBef>
-                <a:spcPts val="0"/>
-              </a:spcBef>
-            </a:pPr>
-            <a:r>
-              <a:rPr lang="en-US" dirty="0"/>
-              <a:t>Linear regression</a:t>
-            </a:r>
-          </a:p>
-          <a:p>
-            <a:pPr marL="800100" lvl="1">
-              <a:spcBef>
-                <a:spcPts val="0"/>
-              </a:spcBef>
-            </a:pPr>
-            <a:r>
-              <a:rPr lang="en-US" dirty="0"/>
-              <a:t>Pearson rank correlation</a:t>
-            </a:r>
-          </a:p>
-          <a:p>
-            <a:pPr marL="800100" lvl="1">
-              <a:spcBef>
-                <a:spcPts val="0"/>
-              </a:spcBef>
-            </a:pPr>
-            <a:endParaRPr lang="en-US" dirty="0"/>
+            <a:endParaRPr lang="en-US"/>
           </a:p>
         </p:txBody>
       </p:sp>
     </p:spTree>
+    <p:extLst>
+      <p:ext uri="{BB962C8B-B14F-4D97-AF65-F5344CB8AC3E}">
+        <p14:creationId xmlns:p14="http://schemas.microsoft.com/office/powerpoint/2010/main" val="78247441"/>
+      </p:ext>
+    </p:extLst>
   </p:cSld>
   <p:clrMapOvr>
     <a:masterClrMapping/>
@@ -20901,18 +21020,12 @@
 </p:sld>
 </file>
 
-<file path=ppt/slides/slide3.xml><?xml version="1.0" encoding="utf-8"?>
+<file path=ppt/slides/slide16.xml><?xml version="1.0" encoding="utf-8"?>
 <p:sld xmlns:a="http://schemas.openxmlformats.org/drawingml/2006/main" xmlns:r="http://schemas.openxmlformats.org/officeDocument/2006/relationships" xmlns:p="http://schemas.openxmlformats.org/presentationml/2006/main">
   <p:cSld>
     <p:spTree>
       <p:nvGrpSpPr>
-        <p:cNvPr id="1" name="Shape 173">
-          <a:extLst>
-            <a:ext uri="{FF2B5EF4-FFF2-40B4-BE49-F238E27FC236}">
-              <a16:creationId xmlns:a16="http://schemas.microsoft.com/office/drawing/2014/main" id="{F4BEE07C-4BCB-1C54-3F1E-BC1978460073}"/>
-            </a:ext>
-          </a:extLst>
-        </p:cNvPr>
+        <p:cNvPr id="1" name=""/>
         <p:cNvGrpSpPr/>
         <p:nvPr/>
       </p:nvGrpSpPr>
@@ -20926,180 +21039,89 @@
       </p:grpSpPr>
       <p:sp>
         <p:nvSpPr>
-          <p:cNvPr id="174" name="Google Shape;174;p2">
+          <p:cNvPr id="2" name="Title 1">
             <a:extLst>
               <a:ext uri="{FF2B5EF4-FFF2-40B4-BE49-F238E27FC236}">
-                <a16:creationId xmlns:a16="http://schemas.microsoft.com/office/drawing/2014/main" id="{95CBE515-F4C1-DE1F-091D-D4D5B40387E2}"/>
+                <a16:creationId xmlns:a16="http://schemas.microsoft.com/office/drawing/2014/main" id="{3A9A4E3A-9B1B-3519-BDE0-AA86D955D435}"/>
               </a:ext>
             </a:extLst>
           </p:cNvPr>
-          <p:cNvSpPr txBox="1">
+          <p:cNvSpPr>
             <a:spLocks noGrp="1"/>
           </p:cNvSpPr>
           <p:nvPr>
             <p:ph type="title"/>
           </p:nvPr>
         </p:nvSpPr>
-        <p:spPr>
-          <a:xfrm>
-            <a:off x="2592925" y="624110"/>
-            <a:ext cx="8911687" cy="1280890"/>
-          </a:xfrm>
-          <a:prstGeom prst="rect">
-            <a:avLst/>
-          </a:prstGeom>
-          <a:noFill/>
-          <a:ln>
-            <a:noFill/>
-          </a:ln>
-        </p:spPr>
+        <p:spPr/>
         <p:txBody>
-          <a:bodyPr spcFirstLastPara="1" wrap="square" lIns="91425" tIns="45700" rIns="91425" bIns="45700" anchor="t" anchorCtr="0">
-            <a:normAutofit/>
-          </a:bodyPr>
+          <a:bodyPr/>
           <a:lstStyle/>
           <a:p>
-            <a:pPr marL="0" lvl="0" indent="0" algn="l" rtl="0">
-              <a:spcBef>
-                <a:spcPts val="0"/>
-              </a:spcBef>
-              <a:spcAft>
-                <a:spcPts val="0"/>
-              </a:spcAft>
-              <a:buClr>
-                <a:srgbClr val="262626"/>
-              </a:buClr>
-              <a:buSzPts val="3600"/>
-              <a:buFont typeface="Century Gothic"/>
-              <a:buNone/>
-            </a:pPr>
             <a:r>
               <a:rPr lang="en-US" dirty="0"/>
-              <a:t>Today we’re going to:</a:t>
+              <a:t>Assumptions of these tests?</a:t>
             </a:r>
-            <a:endParaRPr dirty="0"/>
           </a:p>
         </p:txBody>
       </p:sp>
       <p:sp>
         <p:nvSpPr>
-          <p:cNvPr id="175" name="Google Shape;175;p2">
+          <p:cNvPr id="3" name="Text Placeholder 2">
             <a:extLst>
               <a:ext uri="{FF2B5EF4-FFF2-40B4-BE49-F238E27FC236}">
-                <a16:creationId xmlns:a16="http://schemas.microsoft.com/office/drawing/2014/main" id="{76A16297-855F-E83B-538B-14A468B5636F}"/>
+                <a16:creationId xmlns:a16="http://schemas.microsoft.com/office/drawing/2014/main" id="{BE674624-EB3E-BF88-F3D8-01622F2F7BE1}"/>
               </a:ext>
             </a:extLst>
           </p:cNvPr>
-          <p:cNvSpPr txBox="1">
+          <p:cNvSpPr>
             <a:spLocks noGrp="1"/>
           </p:cNvSpPr>
           <p:nvPr>
             <p:ph type="body" idx="1"/>
           </p:nvPr>
         </p:nvSpPr>
-        <p:spPr>
-          <a:xfrm>
-            <a:off x="2589212" y="2133600"/>
-            <a:ext cx="8915400" cy="2043764"/>
-          </a:xfrm>
-          <a:prstGeom prst="rect">
-            <a:avLst/>
-          </a:prstGeom>
-          <a:noFill/>
-          <a:ln>
-            <a:noFill/>
-          </a:ln>
-        </p:spPr>
+        <p:spPr/>
         <p:txBody>
-          <a:bodyPr spcFirstLastPara="1" wrap="square" lIns="91425" tIns="45700" rIns="91425" bIns="45700" anchor="t" anchorCtr="0">
-            <a:normAutofit lnSpcReduction="10000"/>
-          </a:bodyPr>
+          <a:bodyPr/>
           <a:lstStyle/>
           <a:p>
-            <a:pPr marL="342900" lvl="0" indent="-342900" algn="l" rtl="0">
-              <a:spcBef>
-                <a:spcPts val="0"/>
-              </a:spcBef>
-              <a:spcAft>
-                <a:spcPts val="0"/>
-              </a:spcAft>
-              <a:buSzPts val="1800"/>
-              <a:buChar char="🠶"/>
-            </a:pPr>
             <a:r>
               <a:rPr lang="en-US" dirty="0"/>
-              <a:t>Discuss some common, parametric tests</a:t>
+              <a:t>Normally distributed residuals</a:t>
             </a:r>
           </a:p>
           <a:p>
-            <a:pPr marL="800100" lvl="1">
-              <a:spcBef>
-                <a:spcPts val="0"/>
-              </a:spcBef>
-            </a:pPr>
+            <a:pPr lvl="1"/>
             <a:r>
               <a:rPr lang="en-US" dirty="0"/>
-              <a:t>t test</a:t>
+              <a:t>WHAT DOES THIS MEAN?</a:t>
             </a:r>
           </a:p>
           <a:p>
-            <a:pPr marL="800100" lvl="1">
-              <a:spcBef>
-                <a:spcPts val="0"/>
-              </a:spcBef>
-            </a:pPr>
             <a:r>
               <a:rPr lang="en-US" dirty="0"/>
-              <a:t>ANOVA</a:t>
+              <a:t>Underlying expectation of the distribution</a:t>
             </a:r>
           </a:p>
           <a:p>
-            <a:pPr marL="800100" lvl="1">
-              <a:spcBef>
-                <a:spcPts val="0"/>
-              </a:spcBef>
-            </a:pPr>
+            <a:pPr lvl="1"/>
             <a:r>
               <a:rPr lang="en-US" dirty="0"/>
-              <a:t>Linear regression</a:t>
+              <a:t>But we know that these tests are ‘robust’ to distribution</a:t>
             </a:r>
           </a:p>
           <a:p>
-            <a:pPr marL="800100" lvl="1">
-              <a:spcBef>
-                <a:spcPts val="0"/>
-              </a:spcBef>
-            </a:pPr>
+            <a:pPr lvl="1"/>
             <a:r>
               <a:rPr lang="en-US" dirty="0"/>
-              <a:t>Pearson rank correlation</a:t>
+              <a:t>What does that mean?</a:t>
             </a:r>
           </a:p>
           <a:p>
-            <a:pPr marL="800100" lvl="1">
-              <a:spcBef>
-                <a:spcPts val="0"/>
-              </a:spcBef>
-            </a:pPr>
             <a:endParaRPr lang="en-US" dirty="0"/>
           </a:p>
           <a:p>
-            <a:pPr marL="342900">
-              <a:spcBef>
-                <a:spcPts val="0"/>
-              </a:spcBef>
-            </a:pPr>
-            <a:r>
-              <a:rPr lang="en-US" dirty="0"/>
-              <a:t>Assumptions of these test, and how robust these tests are to the assumptions</a:t>
-            </a:r>
-          </a:p>
-          <a:p>
-            <a:pPr marL="342900">
-              <a:spcBef>
-                <a:spcPts val="0"/>
-              </a:spcBef>
-            </a:pPr>
             <a:endParaRPr lang="en-US" dirty="0"/>
           </a:p>
         </p:txBody>
@@ -21107,7 +21129,7 @@
     </p:spTree>
     <p:extLst>
       <p:ext uri="{BB962C8B-B14F-4D97-AF65-F5344CB8AC3E}">
-        <p14:creationId xmlns:p14="http://schemas.microsoft.com/office/powerpoint/2010/main" val="2097679017"/>
+        <p14:creationId xmlns:p14="http://schemas.microsoft.com/office/powerpoint/2010/main" val="4151767202"/>
       </p:ext>
     </p:extLst>
   </p:cSld>
@@ -21117,18 +21139,12 @@
 </p:sld>
 </file>
 
-<file path=ppt/slides/slide4.xml><?xml version="1.0" encoding="utf-8"?>
+<file path=ppt/slides/slide17.xml><?xml version="1.0" encoding="utf-8"?>
 <p:sld xmlns:a="http://schemas.openxmlformats.org/drawingml/2006/main" xmlns:r="http://schemas.openxmlformats.org/officeDocument/2006/relationships" xmlns:p="http://schemas.openxmlformats.org/presentationml/2006/main">
   <p:cSld>
     <p:spTree>
       <p:nvGrpSpPr>
-        <p:cNvPr id="1" name="Shape 173">
-          <a:extLst>
-            <a:ext uri="{FF2B5EF4-FFF2-40B4-BE49-F238E27FC236}">
-              <a16:creationId xmlns:a16="http://schemas.microsoft.com/office/drawing/2014/main" id="{EE1177CA-BB0F-8DBF-BB5E-6DE09CA876DB}"/>
-            </a:ext>
-          </a:extLst>
-        </p:cNvPr>
+        <p:cNvPr id="1" name=""/>
         <p:cNvGrpSpPr/>
         <p:nvPr/>
       </p:nvGrpSpPr>
@@ -21142,207 +21158,92 @@
       </p:grpSpPr>
       <p:sp>
         <p:nvSpPr>
-          <p:cNvPr id="174" name="Google Shape;174;p2">
+          <p:cNvPr id="2" name="Title 1">
             <a:extLst>
               <a:ext uri="{FF2B5EF4-FFF2-40B4-BE49-F238E27FC236}">
-                <a16:creationId xmlns:a16="http://schemas.microsoft.com/office/drawing/2014/main" id="{297C6DD6-9870-0DF7-926C-0560568DDEE8}"/>
+                <a16:creationId xmlns:a16="http://schemas.microsoft.com/office/drawing/2014/main" id="{B25DFCBE-1DDB-F657-D60F-AF70D7156F64}"/>
               </a:ext>
             </a:extLst>
           </p:cNvPr>
-          <p:cNvSpPr txBox="1">
+          <p:cNvSpPr>
             <a:spLocks noGrp="1"/>
           </p:cNvSpPr>
           <p:nvPr>
             <p:ph type="title"/>
           </p:nvPr>
         </p:nvSpPr>
-        <p:spPr>
-          <a:xfrm>
-            <a:off x="2592925" y="624110"/>
-            <a:ext cx="8911687" cy="1280890"/>
-          </a:xfrm>
-          <a:prstGeom prst="rect">
-            <a:avLst/>
-          </a:prstGeom>
-          <a:noFill/>
-          <a:ln>
-            <a:noFill/>
-          </a:ln>
-        </p:spPr>
+        <p:spPr/>
         <p:txBody>
-          <a:bodyPr spcFirstLastPara="1" wrap="square" lIns="91425" tIns="45700" rIns="91425" bIns="45700" anchor="t" anchorCtr="0">
-            <a:normAutofit/>
-          </a:bodyPr>
+          <a:bodyPr/>
           <a:lstStyle/>
           <a:p>
-            <a:pPr marL="0" lvl="0" indent="0" algn="l" rtl="0">
-              <a:spcBef>
-                <a:spcPts val="0"/>
-              </a:spcBef>
-              <a:spcAft>
-                <a:spcPts val="0"/>
-              </a:spcAft>
-              <a:buClr>
-                <a:srgbClr val="262626"/>
-              </a:buClr>
-              <a:buSzPts val="3600"/>
-              <a:buFont typeface="Century Gothic"/>
-              <a:buNone/>
-            </a:pPr>
             <a:r>
               <a:rPr lang="en-US" dirty="0"/>
-              <a:t>Today we’re going to:</a:t>
+              <a:t>Assignment today:</a:t>
             </a:r>
-            <a:endParaRPr dirty="0"/>
           </a:p>
         </p:txBody>
       </p:sp>
       <p:sp>
         <p:nvSpPr>
-          <p:cNvPr id="175" name="Google Shape;175;p2">
+          <p:cNvPr id="3" name="Text Placeholder 2">
             <a:extLst>
               <a:ext uri="{FF2B5EF4-FFF2-40B4-BE49-F238E27FC236}">
-                <a16:creationId xmlns:a16="http://schemas.microsoft.com/office/drawing/2014/main" id="{D42C7B49-A690-B9AA-5EE0-C95FE4EC48E1}"/>
+                <a16:creationId xmlns:a16="http://schemas.microsoft.com/office/drawing/2014/main" id="{117D1294-7E80-401A-3AF1-1FE8C8747171}"/>
               </a:ext>
             </a:extLst>
           </p:cNvPr>
-          <p:cNvSpPr txBox="1">
+          <p:cNvSpPr>
             <a:spLocks noGrp="1"/>
           </p:cNvSpPr>
           <p:nvPr>
             <p:ph type="body" idx="1"/>
           </p:nvPr>
         </p:nvSpPr>
-        <p:spPr>
-          <a:xfrm>
-            <a:off x="2589212" y="2133600"/>
-            <a:ext cx="8915400" cy="3112168"/>
-          </a:xfrm>
-          <a:prstGeom prst="rect">
-            <a:avLst/>
-          </a:prstGeom>
-          <a:noFill/>
-          <a:ln>
-            <a:noFill/>
-          </a:ln>
-        </p:spPr>
+        <p:spPr/>
         <p:txBody>
-          <a:bodyPr spcFirstLastPara="1" wrap="square" lIns="91425" tIns="45700" rIns="91425" bIns="45700" anchor="t" anchorCtr="0">
-            <a:normAutofit lnSpcReduction="10000"/>
-          </a:bodyPr>
+          <a:bodyPr/>
           <a:lstStyle/>
           <a:p>
-            <a:pPr marL="342900" lvl="0" indent="-342900" algn="l" rtl="0">
-              <a:spcBef>
-                <a:spcPts val="0"/>
-              </a:spcBef>
-              <a:spcAft>
-                <a:spcPts val="0"/>
-              </a:spcAft>
-              <a:buSzPts val="1800"/>
-              <a:buChar char="🠶"/>
-            </a:pPr>
+            <a:r>
+              <a:rPr lang="en-US" dirty="0" err="1"/>
+              <a:t>Rmarkdown</a:t>
+            </a:r>
             <a:r>
               <a:rPr lang="en-US" dirty="0"/>
-              <a:t>Discuss some common, parametric tests</a:t>
+              <a:t> on </a:t>
             </a:r>
-          </a:p>
-          <a:p>
-            <a:pPr marL="800100" lvl="1">
-              <a:spcBef>
-                <a:spcPts val="0"/>
-              </a:spcBef>
-            </a:pPr>
+            <a:r>
+              <a:rPr lang="en-US" dirty="0" err="1"/>
+              <a:t>eClass</a:t>
+            </a:r>
+            <a:endParaRPr lang="en-US" dirty="0"/>
+          </a:p>
+          <a:p>
             <a:r>
               <a:rPr lang="en-US" dirty="0"/>
-              <a:t>t test</a:t>
+              <a:t>Look for QUESTIONS peppered throughout – really give some thought to answering this. </a:t>
             </a:r>
           </a:p>
           <a:p>
-            <a:pPr marL="800100" lvl="1">
-              <a:spcBef>
-                <a:spcPts val="0"/>
-              </a:spcBef>
-            </a:pPr>
             <a:r>
               <a:rPr lang="en-US" dirty="0"/>
-              <a:t>ANOVA</a:t>
+              <a:t>This is the first time I’m really asking you to simulate data </a:t>
             </a:r>
           </a:p>
           <a:p>
-            <a:pPr marL="800100" lvl="1">
-              <a:spcBef>
-                <a:spcPts val="0"/>
-              </a:spcBef>
-            </a:pPr>
+            <a:pPr lvl="1"/>
             <a:r>
               <a:rPr lang="en-US" dirty="0"/>
-              <a:t>Linear regression</a:t>
+              <a:t>Think about why this is backwards than we would usually do?</a:t>
             </a:r>
-          </a:p>
-          <a:p>
-            <a:pPr marL="800100" lvl="1">
-              <a:spcBef>
-                <a:spcPts val="0"/>
-              </a:spcBef>
-            </a:pPr>
-            <a:r>
-              <a:rPr lang="en-US" dirty="0"/>
-              <a:t>Pearson rank correlation</a:t>
-            </a:r>
-          </a:p>
-          <a:p>
-            <a:pPr marL="800100" lvl="1">
-              <a:spcBef>
-                <a:spcPts val="0"/>
-              </a:spcBef>
-            </a:pPr>
-            <a:endParaRPr lang="en-US" dirty="0"/>
-          </a:p>
-          <a:p>
-            <a:pPr marL="342900">
-              <a:spcBef>
-                <a:spcPts val="0"/>
-              </a:spcBef>
-            </a:pPr>
-            <a:r>
-              <a:rPr lang="en-US" dirty="0"/>
-              <a:t>Assumptions of these test, and how robust these tests are to the assumptions</a:t>
-            </a:r>
-          </a:p>
-          <a:p>
-            <a:pPr marL="342900">
-              <a:spcBef>
-                <a:spcPts val="0"/>
-              </a:spcBef>
-            </a:pPr>
-            <a:endParaRPr lang="en-US" dirty="0"/>
-          </a:p>
-          <a:p>
-            <a:pPr marL="342900">
-              <a:spcBef>
-                <a:spcPts val="0"/>
-              </a:spcBef>
-            </a:pPr>
-            <a:r>
-              <a:rPr lang="en-US" dirty="0"/>
-              <a:t>Simulate data to use these tests (with backstories!), and see what happens when 1) reducible error is extremely high vs extremely low and 2) what happens when assumptions are broken </a:t>
-            </a:r>
-          </a:p>
-          <a:p>
-            <a:pPr marL="342900">
-              <a:spcBef>
-                <a:spcPts val="0"/>
-              </a:spcBef>
-            </a:pPr>
-            <a:endParaRPr lang="en-US" dirty="0"/>
           </a:p>
         </p:txBody>
       </p:sp>
     </p:spTree>
     <p:extLst>
       <p:ext uri="{BB962C8B-B14F-4D97-AF65-F5344CB8AC3E}">
-        <p14:creationId xmlns:p14="http://schemas.microsoft.com/office/powerpoint/2010/main" val="3805526379"/>
+        <p14:creationId xmlns:p14="http://schemas.microsoft.com/office/powerpoint/2010/main" val="554396759"/>
       </p:ext>
     </p:extLst>
   </p:cSld>
@@ -21352,7 +21253,90 @@
 </p:sld>
 </file>
 
-<file path=ppt/slides/slide5.xml><?xml version="1.0" encoding="utf-8"?>
+<file path=ppt/slides/slide2.xml><?xml version="1.0" encoding="utf-8"?>
+<p:sld xmlns:a="http://schemas.openxmlformats.org/drawingml/2006/main" xmlns:r="http://schemas.openxmlformats.org/officeDocument/2006/relationships" xmlns:p="http://schemas.openxmlformats.org/presentationml/2006/main">
+  <p:cSld>
+    <p:spTree>
+      <p:nvGrpSpPr>
+        <p:cNvPr id="1" name=""/>
+        <p:cNvGrpSpPr/>
+        <p:nvPr/>
+      </p:nvGrpSpPr>
+      <p:grpSpPr>
+        <a:xfrm>
+          <a:off x="0" y="0"/>
+          <a:ext cx="0" cy="0"/>
+          <a:chOff x="0" y="0"/>
+          <a:chExt cx="0" cy="0"/>
+        </a:xfrm>
+      </p:grpSpPr>
+      <p:sp>
+        <p:nvSpPr>
+          <p:cNvPr id="2" name="Title 1">
+            <a:extLst>
+              <a:ext uri="{FF2B5EF4-FFF2-40B4-BE49-F238E27FC236}">
+                <a16:creationId xmlns:a16="http://schemas.microsoft.com/office/drawing/2014/main" id="{6B11C26F-FB3B-673C-767B-CBDAFAD4AD7E}"/>
+              </a:ext>
+            </a:extLst>
+          </p:cNvPr>
+          <p:cNvSpPr>
+            <a:spLocks noGrp="1"/>
+          </p:cNvSpPr>
+          <p:nvPr>
+            <p:ph type="title"/>
+          </p:nvPr>
+        </p:nvSpPr>
+        <p:spPr/>
+        <p:txBody>
+          <a:bodyPr/>
+          <a:lstStyle/>
+          <a:p>
+            <a:r>
+              <a:rPr lang="en-US" dirty="0"/>
+              <a:t>Resources on Git have been added to week 2!</a:t>
+            </a:r>
+          </a:p>
+        </p:txBody>
+      </p:sp>
+      <p:sp>
+        <p:nvSpPr>
+          <p:cNvPr id="3" name="Text Placeholder 2">
+            <a:extLst>
+              <a:ext uri="{FF2B5EF4-FFF2-40B4-BE49-F238E27FC236}">
+                <a16:creationId xmlns:a16="http://schemas.microsoft.com/office/drawing/2014/main" id="{3F9E243E-7493-7F8B-4B9F-7C2181468DBF}"/>
+              </a:ext>
+            </a:extLst>
+          </p:cNvPr>
+          <p:cNvSpPr>
+            <a:spLocks noGrp="1"/>
+          </p:cNvSpPr>
+          <p:nvPr>
+            <p:ph type="body" idx="1"/>
+          </p:nvPr>
+        </p:nvSpPr>
+        <p:spPr/>
+        <p:txBody>
+          <a:bodyPr/>
+          <a:lstStyle/>
+          <a:p>
+            <a:endParaRPr lang="en-US"/>
+          </a:p>
+        </p:txBody>
+      </p:sp>
+    </p:spTree>
+    <p:extLst>
+      <p:ext uri="{BB962C8B-B14F-4D97-AF65-F5344CB8AC3E}">
+        <p14:creationId xmlns:p14="http://schemas.microsoft.com/office/powerpoint/2010/main" val="261516187"/>
+      </p:ext>
+    </p:extLst>
+  </p:cSld>
+  <p:clrMapOvr>
+    <a:masterClrMapping/>
+  </p:clrMapOvr>
+</p:sld>
+</file>
+
+<file path=ppt/slides/slide3.xml><?xml version="1.0" encoding="utf-8"?>
 <p:sld xmlns:a="http://schemas.openxmlformats.org/drawingml/2006/main" xmlns:r="http://schemas.openxmlformats.org/officeDocument/2006/relationships" xmlns:p="http://schemas.openxmlformats.org/presentationml/2006/main">
   <p:cSld>
     <p:spTree>
@@ -21450,8 +21434,8 @@
         </p:nvSpPr>
         <p:spPr>
           <a:xfrm>
-            <a:off x="2589212" y="2133600"/>
-            <a:ext cx="8915400" cy="3777622"/>
+            <a:off x="2589212" y="1636295"/>
+            <a:ext cx="8915400" cy="2079057"/>
           </a:xfrm>
           <a:prstGeom prst="rect">
             <a:avLst/>
@@ -21478,6 +21462,45 @@
               <a:buChar char="🠶"/>
             </a:pPr>
             <a:r>
+              <a:rPr lang="en-US" dirty="0" err="1"/>
+              <a:t>Rmarkdown</a:t>
+            </a:r>
+            <a:r>
+              <a:rPr lang="en-US" dirty="0"/>
+              <a:t> </a:t>
+            </a:r>
+          </a:p>
+          <a:p>
+            <a:pPr marL="800100" lvl="1">
+              <a:spcBef>
+                <a:spcPts val="0"/>
+              </a:spcBef>
+            </a:pPr>
+            <a:r>
+              <a:rPr lang="en-US" dirty="0"/>
+              <a:t>What is it, and why is it great?</a:t>
+            </a:r>
+          </a:p>
+          <a:p>
+            <a:pPr marL="800100" lvl="1">
+              <a:spcBef>
+                <a:spcPts val="0"/>
+              </a:spcBef>
+            </a:pPr>
+            <a:endParaRPr lang="en-US" dirty="0"/>
+          </a:p>
+          <a:p>
+            <a:pPr marL="342900" lvl="0" indent="-342900" algn="l" rtl="0">
+              <a:spcBef>
+                <a:spcPts val="0"/>
+              </a:spcBef>
+              <a:spcAft>
+                <a:spcPts val="0"/>
+              </a:spcAft>
+              <a:buSzPts val="1800"/>
+              <a:buChar char="🠶"/>
+            </a:pPr>
+            <a:r>
               <a:rPr lang="en-US" dirty="0"/>
               <a:t>Discuss some common, parametric tests</a:t>
             </a:r>
@@ -21523,7 +21546,7 @@
             </a:pPr>
             <a:r>
               <a:rPr lang="en-US" dirty="0"/>
-              <a:t>Pearson rank correlation</a:t>
+              <a:t>Pearson correlation</a:t>
             </a:r>
           </a:p>
           <a:p>
@@ -21533,55 +21556,6 @@
               </a:spcBef>
             </a:pPr>
             <a:endParaRPr lang="en-US" dirty="0"/>
-          </a:p>
-          <a:p>
-            <a:pPr marL="342900">
-              <a:spcBef>
-                <a:spcPts val="0"/>
-              </a:spcBef>
-            </a:pPr>
-            <a:r>
-              <a:rPr lang="en-US" dirty="0"/>
-              <a:t>Assumptions of these test, and how robust these tests are to the assumptions</a:t>
-            </a:r>
-          </a:p>
-          <a:p>
-            <a:pPr marL="342900">
-              <a:spcBef>
-                <a:spcPts val="0"/>
-              </a:spcBef>
-            </a:pPr>
-            <a:endParaRPr lang="en-US" dirty="0"/>
-          </a:p>
-          <a:p>
-            <a:pPr marL="342900">
-              <a:spcBef>
-                <a:spcPts val="0"/>
-              </a:spcBef>
-            </a:pPr>
-            <a:r>
-              <a:rPr lang="en-US" dirty="0"/>
-              <a:t>Simulate data to use these tests (with backstories!), and see what happens when 1) reducible error is extremely high vs extremely low and 2) what happens when assumptions are broken </a:t>
-            </a:r>
-          </a:p>
-          <a:p>
-            <a:pPr marL="342900">
-              <a:spcBef>
-                <a:spcPts val="0"/>
-              </a:spcBef>
-            </a:pPr>
-            <a:endParaRPr lang="en-US" dirty="0"/>
-          </a:p>
-          <a:p>
-            <a:pPr marL="342900">
-              <a:spcBef>
-                <a:spcPts val="0"/>
-              </a:spcBef>
-            </a:pPr>
-            <a:r>
-              <a:rPr lang="en-US" dirty="0"/>
-              <a:t>Remember, these are all inferential statistics, we’re not doing prediction</a:t>
-            </a:r>
           </a:p>
         </p:txBody>
       </p:sp>
@@ -21598,7 +21572,783 @@
 </p:sld>
 </file>
 
+<file path=ppt/slides/slide4.xml><?xml version="1.0" encoding="utf-8"?>
+<p:sld xmlns:a="http://schemas.openxmlformats.org/drawingml/2006/main" xmlns:r="http://schemas.openxmlformats.org/officeDocument/2006/relationships" xmlns:p="http://schemas.openxmlformats.org/presentationml/2006/main">
+  <p:cSld>
+    <p:spTree>
+      <p:nvGrpSpPr>
+        <p:cNvPr id="1" name="Shape 173">
+          <a:extLst>
+            <a:ext uri="{FF2B5EF4-FFF2-40B4-BE49-F238E27FC236}">
+              <a16:creationId xmlns:a16="http://schemas.microsoft.com/office/drawing/2014/main" id="{2B19BDDE-3770-8245-94DE-A735A6EBC4DC}"/>
+            </a:ext>
+          </a:extLst>
+        </p:cNvPr>
+        <p:cNvGrpSpPr/>
+        <p:nvPr/>
+      </p:nvGrpSpPr>
+      <p:grpSpPr>
+        <a:xfrm>
+          <a:off x="0" y="0"/>
+          <a:ext cx="0" cy="0"/>
+          <a:chOff x="0" y="0"/>
+          <a:chExt cx="0" cy="0"/>
+        </a:xfrm>
+      </p:grpSpPr>
+      <p:sp>
+        <p:nvSpPr>
+          <p:cNvPr id="174" name="Google Shape;174;p2">
+            <a:extLst>
+              <a:ext uri="{FF2B5EF4-FFF2-40B4-BE49-F238E27FC236}">
+                <a16:creationId xmlns:a16="http://schemas.microsoft.com/office/drawing/2014/main" id="{F65A41EE-444F-984E-468B-1F9BA7961648}"/>
+              </a:ext>
+            </a:extLst>
+          </p:cNvPr>
+          <p:cNvSpPr txBox="1">
+            <a:spLocks noGrp="1"/>
+          </p:cNvSpPr>
+          <p:nvPr>
+            <p:ph type="title"/>
+          </p:nvPr>
+        </p:nvSpPr>
+        <p:spPr>
+          <a:xfrm>
+            <a:off x="2592925" y="624110"/>
+            <a:ext cx="8911687" cy="1280890"/>
+          </a:xfrm>
+          <a:prstGeom prst="rect">
+            <a:avLst/>
+          </a:prstGeom>
+          <a:noFill/>
+          <a:ln>
+            <a:noFill/>
+          </a:ln>
+        </p:spPr>
+        <p:txBody>
+          <a:bodyPr spcFirstLastPara="1" wrap="square" lIns="91425" tIns="45700" rIns="91425" bIns="45700" anchor="t" anchorCtr="0">
+            <a:normAutofit/>
+          </a:bodyPr>
+          <a:lstStyle/>
+          <a:p>
+            <a:pPr marL="0" lvl="0" indent="0" algn="l" rtl="0">
+              <a:spcBef>
+                <a:spcPts val="0"/>
+              </a:spcBef>
+              <a:spcAft>
+                <a:spcPts val="0"/>
+              </a:spcAft>
+              <a:buClr>
+                <a:srgbClr val="262626"/>
+              </a:buClr>
+              <a:buSzPts val="3600"/>
+              <a:buFont typeface="Century Gothic"/>
+              <a:buNone/>
+            </a:pPr>
+            <a:r>
+              <a:rPr lang="en-US" dirty="0"/>
+              <a:t>Today we’re going to:</a:t>
+            </a:r>
+            <a:endParaRPr dirty="0"/>
+          </a:p>
+        </p:txBody>
+      </p:sp>
+      <p:sp>
+        <p:nvSpPr>
+          <p:cNvPr id="175" name="Google Shape;175;p2">
+            <a:extLst>
+              <a:ext uri="{FF2B5EF4-FFF2-40B4-BE49-F238E27FC236}">
+                <a16:creationId xmlns:a16="http://schemas.microsoft.com/office/drawing/2014/main" id="{F48F0A63-1106-139E-33A5-E5DFD1F372ED}"/>
+              </a:ext>
+            </a:extLst>
+          </p:cNvPr>
+          <p:cNvSpPr txBox="1">
+            <a:spLocks noGrp="1"/>
+          </p:cNvSpPr>
+          <p:nvPr>
+            <p:ph type="body" idx="1"/>
+          </p:nvPr>
+        </p:nvSpPr>
+        <p:spPr>
+          <a:xfrm>
+            <a:off x="2589212" y="1636295"/>
+            <a:ext cx="8915400" cy="2079057"/>
+          </a:xfrm>
+          <a:prstGeom prst="rect">
+            <a:avLst/>
+          </a:prstGeom>
+          <a:noFill/>
+          <a:ln>
+            <a:noFill/>
+          </a:ln>
+        </p:spPr>
+        <p:txBody>
+          <a:bodyPr spcFirstLastPara="1" wrap="square" lIns="91425" tIns="45700" rIns="91425" bIns="45700" anchor="t" anchorCtr="0">
+            <a:normAutofit lnSpcReduction="10000"/>
+          </a:bodyPr>
+          <a:lstStyle/>
+          <a:p>
+            <a:pPr marL="342900" lvl="0" indent="-342900" algn="l" rtl="0">
+              <a:spcBef>
+                <a:spcPts val="0"/>
+              </a:spcBef>
+              <a:spcAft>
+                <a:spcPts val="0"/>
+              </a:spcAft>
+              <a:buSzPts val="1800"/>
+              <a:buChar char="🠶"/>
+            </a:pPr>
+            <a:r>
+              <a:rPr lang="en-US" dirty="0" err="1"/>
+              <a:t>Rmarkdown</a:t>
+            </a:r>
+            <a:r>
+              <a:rPr lang="en-US" dirty="0"/>
+              <a:t> </a:t>
+            </a:r>
+          </a:p>
+          <a:p>
+            <a:pPr marL="800100" lvl="1">
+              <a:spcBef>
+                <a:spcPts val="0"/>
+              </a:spcBef>
+            </a:pPr>
+            <a:r>
+              <a:rPr lang="en-US" dirty="0"/>
+              <a:t>What is it, and why is it great?</a:t>
+            </a:r>
+          </a:p>
+          <a:p>
+            <a:pPr marL="800100" lvl="1">
+              <a:spcBef>
+                <a:spcPts val="0"/>
+              </a:spcBef>
+            </a:pPr>
+            <a:endParaRPr lang="en-US" dirty="0"/>
+          </a:p>
+          <a:p>
+            <a:pPr marL="342900" lvl="0" indent="-342900" algn="l" rtl="0">
+              <a:spcBef>
+                <a:spcPts val="0"/>
+              </a:spcBef>
+              <a:spcAft>
+                <a:spcPts val="0"/>
+              </a:spcAft>
+              <a:buSzPts val="1800"/>
+              <a:buChar char="🠶"/>
+            </a:pPr>
+            <a:r>
+              <a:rPr lang="en-US" dirty="0"/>
+              <a:t>Discuss some common, parametric tests</a:t>
+            </a:r>
+          </a:p>
+          <a:p>
+            <a:pPr marL="800100" lvl="1">
+              <a:spcBef>
+                <a:spcPts val="0"/>
+              </a:spcBef>
+            </a:pPr>
+            <a:r>
+              <a:rPr lang="en-US" dirty="0"/>
+              <a:t>t test</a:t>
+            </a:r>
+          </a:p>
+          <a:p>
+            <a:pPr marL="800100" lvl="1">
+              <a:spcBef>
+                <a:spcPts val="0"/>
+              </a:spcBef>
+            </a:pPr>
+            <a:r>
+              <a:rPr lang="en-US" dirty="0"/>
+              <a:t>ANOVA</a:t>
+            </a:r>
+          </a:p>
+          <a:p>
+            <a:pPr marL="800100" lvl="1">
+              <a:spcBef>
+                <a:spcPts val="0"/>
+              </a:spcBef>
+            </a:pPr>
+            <a:r>
+              <a:rPr lang="en-US" dirty="0"/>
+              <a:t>Linear regression</a:t>
+            </a:r>
+          </a:p>
+          <a:p>
+            <a:pPr marL="800100" lvl="1">
+              <a:spcBef>
+                <a:spcPts val="0"/>
+              </a:spcBef>
+            </a:pPr>
+            <a:r>
+              <a:rPr lang="en-US" dirty="0"/>
+              <a:t>Pearson correlation</a:t>
+            </a:r>
+          </a:p>
+          <a:p>
+            <a:pPr marL="800100" lvl="1">
+              <a:spcBef>
+                <a:spcPts val="0"/>
+              </a:spcBef>
+            </a:pPr>
+            <a:endParaRPr lang="en-US" dirty="0"/>
+          </a:p>
+        </p:txBody>
+      </p:sp>
+    </p:spTree>
+    <p:extLst>
+      <p:ext uri="{BB962C8B-B14F-4D97-AF65-F5344CB8AC3E}">
+        <p14:creationId xmlns:p14="http://schemas.microsoft.com/office/powerpoint/2010/main" val="1856019371"/>
+      </p:ext>
+    </p:extLst>
+  </p:cSld>
+  <p:clrMapOvr>
+    <a:masterClrMapping/>
+  </p:clrMapOvr>
+</p:sld>
+</file>
+
+<file path=ppt/slides/slide5.xml><?xml version="1.0" encoding="utf-8"?>
+<p:sld xmlns:a="http://schemas.openxmlformats.org/drawingml/2006/main" xmlns:r="http://schemas.openxmlformats.org/officeDocument/2006/relationships" xmlns:p="http://schemas.openxmlformats.org/presentationml/2006/main">
+  <p:cSld>
+    <p:spTree>
+      <p:nvGrpSpPr>
+        <p:cNvPr id="1" name="Shape 173">
+          <a:extLst>
+            <a:ext uri="{FF2B5EF4-FFF2-40B4-BE49-F238E27FC236}">
+              <a16:creationId xmlns:a16="http://schemas.microsoft.com/office/drawing/2014/main" id="{2026805F-65AF-D59E-71A2-742BEC3EEE63}"/>
+            </a:ext>
+          </a:extLst>
+        </p:cNvPr>
+        <p:cNvGrpSpPr/>
+        <p:nvPr/>
+      </p:nvGrpSpPr>
+      <p:grpSpPr>
+        <a:xfrm>
+          <a:off x="0" y="0"/>
+          <a:ext cx="0" cy="0"/>
+          <a:chOff x="0" y="0"/>
+          <a:chExt cx="0" cy="0"/>
+        </a:xfrm>
+      </p:grpSpPr>
+      <p:sp>
+        <p:nvSpPr>
+          <p:cNvPr id="174" name="Google Shape;174;p2">
+            <a:extLst>
+              <a:ext uri="{FF2B5EF4-FFF2-40B4-BE49-F238E27FC236}">
+                <a16:creationId xmlns:a16="http://schemas.microsoft.com/office/drawing/2014/main" id="{0281A82B-2ED8-700E-40D5-A4E05CFC2020}"/>
+              </a:ext>
+            </a:extLst>
+          </p:cNvPr>
+          <p:cNvSpPr txBox="1">
+            <a:spLocks noGrp="1"/>
+          </p:cNvSpPr>
+          <p:nvPr>
+            <p:ph type="title"/>
+          </p:nvPr>
+        </p:nvSpPr>
+        <p:spPr>
+          <a:xfrm>
+            <a:off x="2592925" y="624110"/>
+            <a:ext cx="8911687" cy="1280890"/>
+          </a:xfrm>
+          <a:prstGeom prst="rect">
+            <a:avLst/>
+          </a:prstGeom>
+          <a:noFill/>
+          <a:ln>
+            <a:noFill/>
+          </a:ln>
+        </p:spPr>
+        <p:txBody>
+          <a:bodyPr spcFirstLastPara="1" wrap="square" lIns="91425" tIns="45700" rIns="91425" bIns="45700" anchor="t" anchorCtr="0">
+            <a:normAutofit/>
+          </a:bodyPr>
+          <a:lstStyle/>
+          <a:p>
+            <a:pPr marL="0" lvl="0" indent="0" algn="l" rtl="0">
+              <a:spcBef>
+                <a:spcPts val="0"/>
+              </a:spcBef>
+              <a:spcAft>
+                <a:spcPts val="0"/>
+              </a:spcAft>
+              <a:buClr>
+                <a:srgbClr val="262626"/>
+              </a:buClr>
+              <a:buSzPts val="3600"/>
+              <a:buFont typeface="Century Gothic"/>
+              <a:buNone/>
+            </a:pPr>
+            <a:r>
+              <a:rPr lang="en-US" dirty="0"/>
+              <a:t>Today we’re going to:</a:t>
+            </a:r>
+            <a:endParaRPr dirty="0"/>
+          </a:p>
+        </p:txBody>
+      </p:sp>
+      <p:sp>
+        <p:nvSpPr>
+          <p:cNvPr id="175" name="Google Shape;175;p2">
+            <a:extLst>
+              <a:ext uri="{FF2B5EF4-FFF2-40B4-BE49-F238E27FC236}">
+                <a16:creationId xmlns:a16="http://schemas.microsoft.com/office/drawing/2014/main" id="{36D601C1-6C1E-36FB-B9B1-37681E26D283}"/>
+              </a:ext>
+            </a:extLst>
+          </p:cNvPr>
+          <p:cNvSpPr txBox="1">
+            <a:spLocks noGrp="1"/>
+          </p:cNvSpPr>
+          <p:nvPr>
+            <p:ph type="body" idx="1"/>
+          </p:nvPr>
+        </p:nvSpPr>
+        <p:spPr>
+          <a:xfrm>
+            <a:off x="2589212" y="1636296"/>
+            <a:ext cx="8915400" cy="2820202"/>
+          </a:xfrm>
+          <a:prstGeom prst="rect">
+            <a:avLst/>
+          </a:prstGeom>
+          <a:noFill/>
+          <a:ln>
+            <a:noFill/>
+          </a:ln>
+        </p:spPr>
+        <p:txBody>
+          <a:bodyPr spcFirstLastPara="1" wrap="square" lIns="91425" tIns="45700" rIns="91425" bIns="45700" anchor="t" anchorCtr="0">
+            <a:normAutofit lnSpcReduction="10000"/>
+          </a:bodyPr>
+          <a:lstStyle/>
+          <a:p>
+            <a:pPr marL="342900" lvl="0" indent="-342900" algn="l" rtl="0">
+              <a:spcBef>
+                <a:spcPts val="0"/>
+              </a:spcBef>
+              <a:spcAft>
+                <a:spcPts val="0"/>
+              </a:spcAft>
+              <a:buSzPts val="1800"/>
+              <a:buChar char="🠶"/>
+            </a:pPr>
+            <a:r>
+              <a:rPr lang="en-US" dirty="0" err="1"/>
+              <a:t>Rmarkdown</a:t>
+            </a:r>
+            <a:r>
+              <a:rPr lang="en-US" dirty="0"/>
+              <a:t> </a:t>
+            </a:r>
+          </a:p>
+          <a:p>
+            <a:pPr marL="800100" lvl="1">
+              <a:spcBef>
+                <a:spcPts val="0"/>
+              </a:spcBef>
+            </a:pPr>
+            <a:r>
+              <a:rPr lang="en-US" dirty="0"/>
+              <a:t>What is it, and why is it great?</a:t>
+            </a:r>
+          </a:p>
+          <a:p>
+            <a:pPr marL="800100" lvl="1">
+              <a:spcBef>
+                <a:spcPts val="0"/>
+              </a:spcBef>
+            </a:pPr>
+            <a:endParaRPr lang="en-US" dirty="0"/>
+          </a:p>
+          <a:p>
+            <a:pPr marL="342900" lvl="0" indent="-342900" algn="l" rtl="0">
+              <a:spcBef>
+                <a:spcPts val="0"/>
+              </a:spcBef>
+              <a:spcAft>
+                <a:spcPts val="0"/>
+              </a:spcAft>
+              <a:buSzPts val="1800"/>
+              <a:buChar char="🠶"/>
+            </a:pPr>
+            <a:r>
+              <a:rPr lang="en-US" dirty="0"/>
+              <a:t>Discuss some common, parametric tests</a:t>
+            </a:r>
+          </a:p>
+          <a:p>
+            <a:pPr marL="800100" lvl="1">
+              <a:spcBef>
+                <a:spcPts val="0"/>
+              </a:spcBef>
+            </a:pPr>
+            <a:r>
+              <a:rPr lang="en-US" dirty="0"/>
+              <a:t>t test</a:t>
+            </a:r>
+          </a:p>
+          <a:p>
+            <a:pPr marL="800100" lvl="1">
+              <a:spcBef>
+                <a:spcPts val="0"/>
+              </a:spcBef>
+            </a:pPr>
+            <a:r>
+              <a:rPr lang="en-US" dirty="0"/>
+              <a:t>ANOVA</a:t>
+            </a:r>
+          </a:p>
+          <a:p>
+            <a:pPr marL="800100" lvl="1">
+              <a:spcBef>
+                <a:spcPts val="0"/>
+              </a:spcBef>
+            </a:pPr>
+            <a:r>
+              <a:rPr lang="en-US" dirty="0"/>
+              <a:t>Linear regression</a:t>
+            </a:r>
+          </a:p>
+          <a:p>
+            <a:pPr marL="800100" lvl="1">
+              <a:spcBef>
+                <a:spcPts val="0"/>
+              </a:spcBef>
+            </a:pPr>
+            <a:r>
+              <a:rPr lang="en-US" dirty="0"/>
+              <a:t>Pearson correlation</a:t>
+            </a:r>
+          </a:p>
+          <a:p>
+            <a:pPr marL="800100" lvl="1">
+              <a:spcBef>
+                <a:spcPts val="0"/>
+              </a:spcBef>
+            </a:pPr>
+            <a:endParaRPr lang="en-US" dirty="0"/>
+          </a:p>
+          <a:p>
+            <a:pPr marL="342900">
+              <a:spcBef>
+                <a:spcPts val="0"/>
+              </a:spcBef>
+            </a:pPr>
+            <a:r>
+              <a:rPr lang="en-US" dirty="0"/>
+              <a:t>Assumptions of these test, and how robust these tests are to the assumptions</a:t>
+            </a:r>
+          </a:p>
+          <a:p>
+            <a:pPr marL="342900">
+              <a:spcBef>
+                <a:spcPts val="0"/>
+              </a:spcBef>
+            </a:pPr>
+            <a:endParaRPr lang="en-US" dirty="0"/>
+          </a:p>
+        </p:txBody>
+      </p:sp>
+    </p:spTree>
+    <p:extLst>
+      <p:ext uri="{BB962C8B-B14F-4D97-AF65-F5344CB8AC3E}">
+        <p14:creationId xmlns:p14="http://schemas.microsoft.com/office/powerpoint/2010/main" val="1572386287"/>
+      </p:ext>
+    </p:extLst>
+  </p:cSld>
+  <p:clrMapOvr>
+    <a:masterClrMapping/>
+  </p:clrMapOvr>
+</p:sld>
+</file>
+
 <file path=ppt/slides/slide6.xml><?xml version="1.0" encoding="utf-8"?>
+<p:sld xmlns:a="http://schemas.openxmlformats.org/drawingml/2006/main" xmlns:r="http://schemas.openxmlformats.org/officeDocument/2006/relationships" xmlns:p="http://schemas.openxmlformats.org/presentationml/2006/main">
+  <p:cSld>
+    <p:spTree>
+      <p:nvGrpSpPr>
+        <p:cNvPr id="1" name="Shape 173">
+          <a:extLst>
+            <a:ext uri="{FF2B5EF4-FFF2-40B4-BE49-F238E27FC236}">
+              <a16:creationId xmlns:a16="http://schemas.microsoft.com/office/drawing/2014/main" id="{E439C965-EC52-92EB-3A79-9CFD604443E0}"/>
+            </a:ext>
+          </a:extLst>
+        </p:cNvPr>
+        <p:cNvGrpSpPr/>
+        <p:nvPr/>
+      </p:nvGrpSpPr>
+      <p:grpSpPr>
+        <a:xfrm>
+          <a:off x="0" y="0"/>
+          <a:ext cx="0" cy="0"/>
+          <a:chOff x="0" y="0"/>
+          <a:chExt cx="0" cy="0"/>
+        </a:xfrm>
+      </p:grpSpPr>
+      <p:sp>
+        <p:nvSpPr>
+          <p:cNvPr id="174" name="Google Shape;174;p2">
+            <a:extLst>
+              <a:ext uri="{FF2B5EF4-FFF2-40B4-BE49-F238E27FC236}">
+                <a16:creationId xmlns:a16="http://schemas.microsoft.com/office/drawing/2014/main" id="{68475363-C988-C8C9-06F6-5E86D53F8215}"/>
+              </a:ext>
+            </a:extLst>
+          </p:cNvPr>
+          <p:cNvSpPr txBox="1">
+            <a:spLocks noGrp="1"/>
+          </p:cNvSpPr>
+          <p:nvPr>
+            <p:ph type="title"/>
+          </p:nvPr>
+        </p:nvSpPr>
+        <p:spPr>
+          <a:xfrm>
+            <a:off x="2592925" y="624110"/>
+            <a:ext cx="8911687" cy="1280890"/>
+          </a:xfrm>
+          <a:prstGeom prst="rect">
+            <a:avLst/>
+          </a:prstGeom>
+          <a:noFill/>
+          <a:ln>
+            <a:noFill/>
+          </a:ln>
+        </p:spPr>
+        <p:txBody>
+          <a:bodyPr spcFirstLastPara="1" wrap="square" lIns="91425" tIns="45700" rIns="91425" bIns="45700" anchor="t" anchorCtr="0">
+            <a:normAutofit/>
+          </a:bodyPr>
+          <a:lstStyle/>
+          <a:p>
+            <a:pPr marL="0" lvl="0" indent="0" algn="l" rtl="0">
+              <a:spcBef>
+                <a:spcPts val="0"/>
+              </a:spcBef>
+              <a:spcAft>
+                <a:spcPts val="0"/>
+              </a:spcAft>
+              <a:buClr>
+                <a:srgbClr val="262626"/>
+              </a:buClr>
+              <a:buSzPts val="3600"/>
+              <a:buFont typeface="Century Gothic"/>
+              <a:buNone/>
+            </a:pPr>
+            <a:r>
+              <a:rPr lang="en-US" dirty="0"/>
+              <a:t>Today we’re going to:</a:t>
+            </a:r>
+            <a:endParaRPr dirty="0"/>
+          </a:p>
+        </p:txBody>
+      </p:sp>
+      <p:sp>
+        <p:nvSpPr>
+          <p:cNvPr id="175" name="Google Shape;175;p2">
+            <a:extLst>
+              <a:ext uri="{FF2B5EF4-FFF2-40B4-BE49-F238E27FC236}">
+                <a16:creationId xmlns:a16="http://schemas.microsoft.com/office/drawing/2014/main" id="{2AF5C26D-605B-DA8C-3D2B-D3D3D4F57C70}"/>
+              </a:ext>
+            </a:extLst>
+          </p:cNvPr>
+          <p:cNvSpPr txBox="1">
+            <a:spLocks noGrp="1"/>
+          </p:cNvSpPr>
+          <p:nvPr>
+            <p:ph type="body" idx="1"/>
+          </p:nvPr>
+        </p:nvSpPr>
+        <p:spPr>
+          <a:xfrm>
+            <a:off x="2589212" y="1636295"/>
+            <a:ext cx="8915400" cy="4274927"/>
+          </a:xfrm>
+          <a:prstGeom prst="rect">
+            <a:avLst/>
+          </a:prstGeom>
+          <a:noFill/>
+          <a:ln>
+            <a:noFill/>
+          </a:ln>
+        </p:spPr>
+        <p:txBody>
+          <a:bodyPr spcFirstLastPara="1" wrap="square" lIns="91425" tIns="45700" rIns="91425" bIns="45700" anchor="t" anchorCtr="0">
+            <a:normAutofit lnSpcReduction="10000"/>
+          </a:bodyPr>
+          <a:lstStyle/>
+          <a:p>
+            <a:pPr marL="342900" lvl="0" indent="-342900" algn="l" rtl="0">
+              <a:spcBef>
+                <a:spcPts val="0"/>
+              </a:spcBef>
+              <a:spcAft>
+                <a:spcPts val="0"/>
+              </a:spcAft>
+              <a:buSzPts val="1800"/>
+              <a:buChar char="🠶"/>
+            </a:pPr>
+            <a:r>
+              <a:rPr lang="en-US" dirty="0" err="1"/>
+              <a:t>Rmarkdown</a:t>
+            </a:r>
+            <a:r>
+              <a:rPr lang="en-US" dirty="0"/>
+              <a:t> </a:t>
+            </a:r>
+          </a:p>
+          <a:p>
+            <a:pPr marL="800100" lvl="1">
+              <a:spcBef>
+                <a:spcPts val="0"/>
+              </a:spcBef>
+            </a:pPr>
+            <a:r>
+              <a:rPr lang="en-US" dirty="0"/>
+              <a:t>What is it, and why is it great?</a:t>
+            </a:r>
+          </a:p>
+          <a:p>
+            <a:pPr marL="800100" lvl="1">
+              <a:spcBef>
+                <a:spcPts val="0"/>
+              </a:spcBef>
+            </a:pPr>
+            <a:endParaRPr lang="en-US" dirty="0"/>
+          </a:p>
+          <a:p>
+            <a:pPr marL="342900" lvl="0" indent="-342900" algn="l" rtl="0">
+              <a:spcBef>
+                <a:spcPts val="0"/>
+              </a:spcBef>
+              <a:spcAft>
+                <a:spcPts val="0"/>
+              </a:spcAft>
+              <a:buSzPts val="1800"/>
+              <a:buChar char="🠶"/>
+            </a:pPr>
+            <a:r>
+              <a:rPr lang="en-US" dirty="0"/>
+              <a:t>Discuss some common, parametric tests</a:t>
+            </a:r>
+          </a:p>
+          <a:p>
+            <a:pPr marL="800100" lvl="1">
+              <a:spcBef>
+                <a:spcPts val="0"/>
+              </a:spcBef>
+            </a:pPr>
+            <a:r>
+              <a:rPr lang="en-US" dirty="0"/>
+              <a:t>t test</a:t>
+            </a:r>
+          </a:p>
+          <a:p>
+            <a:pPr marL="800100" lvl="1">
+              <a:spcBef>
+                <a:spcPts val="0"/>
+              </a:spcBef>
+            </a:pPr>
+            <a:r>
+              <a:rPr lang="en-US" dirty="0"/>
+              <a:t>ANOVA</a:t>
+            </a:r>
+          </a:p>
+          <a:p>
+            <a:pPr marL="800100" lvl="1">
+              <a:spcBef>
+                <a:spcPts val="0"/>
+              </a:spcBef>
+            </a:pPr>
+            <a:r>
+              <a:rPr lang="en-US" dirty="0"/>
+              <a:t>Linear regression</a:t>
+            </a:r>
+          </a:p>
+          <a:p>
+            <a:pPr marL="800100" lvl="1">
+              <a:spcBef>
+                <a:spcPts val="0"/>
+              </a:spcBef>
+            </a:pPr>
+            <a:r>
+              <a:rPr lang="en-US" dirty="0"/>
+              <a:t>Pearson correlation</a:t>
+            </a:r>
+          </a:p>
+          <a:p>
+            <a:pPr marL="800100" lvl="1">
+              <a:spcBef>
+                <a:spcPts val="0"/>
+              </a:spcBef>
+            </a:pPr>
+            <a:endParaRPr lang="en-US" dirty="0"/>
+          </a:p>
+          <a:p>
+            <a:pPr marL="342900">
+              <a:spcBef>
+                <a:spcPts val="0"/>
+              </a:spcBef>
+            </a:pPr>
+            <a:r>
+              <a:rPr lang="en-US" dirty="0"/>
+              <a:t>Assumptions of these test, and how robust these tests are to the assumptions</a:t>
+            </a:r>
+          </a:p>
+          <a:p>
+            <a:pPr marL="342900">
+              <a:spcBef>
+                <a:spcPts val="0"/>
+              </a:spcBef>
+            </a:pPr>
+            <a:endParaRPr lang="en-US" dirty="0"/>
+          </a:p>
+          <a:p>
+            <a:pPr marL="342900">
+              <a:spcBef>
+                <a:spcPts val="0"/>
+              </a:spcBef>
+            </a:pPr>
+            <a:r>
+              <a:rPr lang="en-US" dirty="0"/>
+              <a:t>Simulate data to use these tests (with backstories!), and see what happens when 1) reducible error is extremely high vs extremely low and 2) what happens when assumptions are broken </a:t>
+            </a:r>
+          </a:p>
+          <a:p>
+            <a:pPr marL="342900">
+              <a:spcBef>
+                <a:spcPts val="0"/>
+              </a:spcBef>
+            </a:pPr>
+            <a:endParaRPr lang="en-US" dirty="0"/>
+          </a:p>
+          <a:p>
+            <a:pPr marL="342900">
+              <a:spcBef>
+                <a:spcPts val="0"/>
+              </a:spcBef>
+            </a:pPr>
+            <a:r>
+              <a:rPr lang="en-US" dirty="0"/>
+              <a:t>Remember, these are all inferential statistics, we’re not doing prediction</a:t>
+            </a:r>
+          </a:p>
+        </p:txBody>
+      </p:sp>
+    </p:spTree>
+    <p:extLst>
+      <p:ext uri="{BB962C8B-B14F-4D97-AF65-F5344CB8AC3E}">
+        <p14:creationId xmlns:p14="http://schemas.microsoft.com/office/powerpoint/2010/main" val="3006242310"/>
+      </p:ext>
+    </p:extLst>
+  </p:cSld>
+  <p:clrMapOvr>
+    <a:masterClrMapping/>
+  </p:clrMapOvr>
+</p:sld>
+</file>
+
+<file path=ppt/slides/slide7.xml><?xml version="1.0" encoding="utf-8"?>
 <p:sld xmlns:a="http://schemas.openxmlformats.org/drawingml/2006/main" xmlns:r="http://schemas.openxmlformats.org/officeDocument/2006/relationships" xmlns:p="http://schemas.openxmlformats.org/presentationml/2006/main">
   <p:cSld>
     <p:spTree>
@@ -21727,7 +22477,7 @@
 </p:sld>
 </file>
 
-<file path=ppt/slides/slide7.xml><?xml version="1.0" encoding="utf-8"?>
+<file path=ppt/slides/slide8.xml><?xml version="1.0" encoding="utf-8"?>
 <p:sld xmlns:a="http://schemas.openxmlformats.org/drawingml/2006/main" xmlns:r="http://schemas.openxmlformats.org/officeDocument/2006/relationships" xmlns:p="http://schemas.openxmlformats.org/presentationml/2006/main">
   <p:cSld>
     <p:spTree>
@@ -21848,7 +22598,7 @@
 </p:sld>
 </file>
 
-<file path=ppt/slides/slide8.xml><?xml version="1.0" encoding="utf-8"?>
+<file path=ppt/slides/slide9.xml><?xml version="1.0" encoding="utf-8"?>
 <p:sld xmlns:a="http://schemas.openxmlformats.org/drawingml/2006/main" xmlns:r="http://schemas.openxmlformats.org/officeDocument/2006/relationships" xmlns:p="http://schemas.openxmlformats.org/presentationml/2006/main">
   <p:cSld>
     <p:spTree>
@@ -21966,127 +22716,6 @@
     <p:extLst>
       <p:ext uri="{BB962C8B-B14F-4D97-AF65-F5344CB8AC3E}">
         <p14:creationId xmlns:p14="http://schemas.microsoft.com/office/powerpoint/2010/main" val="2239652875"/>
-      </p:ext>
-    </p:extLst>
-  </p:cSld>
-  <p:clrMapOvr>
-    <a:masterClrMapping/>
-  </p:clrMapOvr>
-</p:sld>
-</file>
-
-<file path=ppt/slides/slide9.xml><?xml version="1.0" encoding="utf-8"?>
-<p:sld xmlns:a="http://schemas.openxmlformats.org/drawingml/2006/main" xmlns:r="http://schemas.openxmlformats.org/officeDocument/2006/relationships" xmlns:p="http://schemas.openxmlformats.org/presentationml/2006/main">
-  <p:cSld>
-    <p:spTree>
-      <p:nvGrpSpPr>
-        <p:cNvPr id="1" name=""/>
-        <p:cNvGrpSpPr/>
-        <p:nvPr/>
-      </p:nvGrpSpPr>
-      <p:grpSpPr>
-        <a:xfrm>
-          <a:off x="0" y="0"/>
-          <a:ext cx="0" cy="0"/>
-          <a:chOff x="0" y="0"/>
-          <a:chExt cx="0" cy="0"/>
-        </a:xfrm>
-      </p:grpSpPr>
-      <p:sp>
-        <p:nvSpPr>
-          <p:cNvPr id="2" name="Title 1">
-            <a:extLst>
-              <a:ext uri="{FF2B5EF4-FFF2-40B4-BE49-F238E27FC236}">
-                <a16:creationId xmlns:a16="http://schemas.microsoft.com/office/drawing/2014/main" id="{BCBF3ABE-1301-6EAC-8950-77F811CF9B71}"/>
-              </a:ext>
-            </a:extLst>
-          </p:cNvPr>
-          <p:cNvSpPr>
-            <a:spLocks noGrp="1"/>
-          </p:cNvSpPr>
-          <p:nvPr>
-            <p:ph type="title"/>
-          </p:nvPr>
-        </p:nvSpPr>
-        <p:spPr/>
-        <p:txBody>
-          <a:bodyPr/>
-          <a:lstStyle/>
-          <a:p>
-            <a:r>
-              <a:rPr lang="en-US" dirty="0"/>
-              <a:t>Two sample t test</a:t>
-            </a:r>
-          </a:p>
-        </p:txBody>
-      </p:sp>
-      <p:sp>
-        <p:nvSpPr>
-          <p:cNvPr id="3" name="Text Placeholder 2">
-            <a:extLst>
-              <a:ext uri="{FF2B5EF4-FFF2-40B4-BE49-F238E27FC236}">
-                <a16:creationId xmlns:a16="http://schemas.microsoft.com/office/drawing/2014/main" id="{41A023D3-AEAA-E555-C53A-4185A3198826}"/>
-              </a:ext>
-            </a:extLst>
-          </p:cNvPr>
-          <p:cNvSpPr>
-            <a:spLocks noGrp="1"/>
-          </p:cNvSpPr>
-          <p:nvPr>
-            <p:ph type="body" idx="1"/>
-          </p:nvPr>
-        </p:nvSpPr>
-        <p:spPr>
-          <a:xfrm>
-            <a:off x="1674812" y="2133600"/>
-            <a:ext cx="4645392" cy="3777622"/>
-          </a:xfrm>
-        </p:spPr>
-        <p:txBody>
-          <a:bodyPr/>
-          <a:lstStyle/>
-          <a:p>
-            <a:r>
-              <a:rPr lang="en-US" dirty="0"/>
-              <a:t>Are these samples different from each other?</a:t>
-            </a:r>
-          </a:p>
-        </p:txBody>
-      </p:sp>
-      <p:pic>
-        <p:nvPicPr>
-          <p:cNvPr id="5" name="Picture 4">
-            <a:extLst>
-              <a:ext uri="{FF2B5EF4-FFF2-40B4-BE49-F238E27FC236}">
-                <a16:creationId xmlns:a16="http://schemas.microsoft.com/office/drawing/2014/main" id="{135FCF47-C2A7-B45F-9A9F-A19C85E8887D}"/>
-              </a:ext>
-            </a:extLst>
-          </p:cNvPr>
-          <p:cNvPicPr>
-            <a:picLocks noChangeAspect="1"/>
-          </p:cNvPicPr>
-          <p:nvPr/>
-        </p:nvPicPr>
-        <p:blipFill>
-          <a:blip r:embed="rId3"/>
-          <a:stretch>
-            <a:fillRect/>
-          </a:stretch>
-        </p:blipFill>
-        <p:spPr>
-          <a:xfrm>
-            <a:off x="6458552" y="1517851"/>
-            <a:ext cx="5733448" cy="3822298"/>
-          </a:xfrm>
-          <a:prstGeom prst="rect">
-            <a:avLst/>
-          </a:prstGeom>
-        </p:spPr>
-      </p:pic>
-    </p:spTree>
-    <p:extLst>
-      <p:ext uri="{BB962C8B-B14F-4D97-AF65-F5344CB8AC3E}">
-        <p14:creationId xmlns:p14="http://schemas.microsoft.com/office/powerpoint/2010/main" val="1185076480"/>
       </p:ext>
     </p:extLst>
   </p:cSld>

</xml_diff>

<commit_message>
added a few questions to the rmd
</commit_message>
<xml_diff>
--- a/Lecture3.pptx
+++ b/Lecture3.pptx
@@ -271,7 +271,7 @@
       <p15:sldGuideLst xmlns:p15="http://schemas.microsoft.com/office/powerpoint/2012/main"/>
     </p:ext>
     <p:ext uri="GoogleSlidesCustomDataVersion2">
-      <go:slidesCustomData xmlns="" xmlns:mc="http://schemas.openxmlformats.org/markup-compatibility/2006" xmlns:mv="urn:schemas-microsoft-com:mac:vml" xmlns:c="http://schemas.openxmlformats.org/drawingml/2006/chart" xmlns:dgm="http://schemas.openxmlformats.org/drawingml/2006/diagram" xmlns:o="urn:schemas-microsoft-com:office:office" xmlns:v="urn:schemas-microsoft-com:vml" xmlns:pvml="urn:schemas-microsoft-com:office:powerpoint" xmlns:com="http://schemas.openxmlformats.org/drawingml/2006/compatibility" xmlns:p14="http://schemas.microsoft.com/office/powerpoint/2010/main" xmlns:p15="http://schemas.microsoft.com/office/powerpoint/2012/main" xmlns:ahyp="http://schemas.microsoft.com/office/drawing/2018/hyperlinkcolor" xmlns:go="http://customooxmlschemas.google.com/" r:id="rId38" roundtripDataSignature="AMtx7mhEk3kr15p5MvOwX8Siehu9UxAE2A=="/>
+      <go:slidesCustomData xmlns:go="http://customooxmlschemas.google.com/" xmlns:ahyp="http://schemas.microsoft.com/office/drawing/2018/hyperlinkcolor" xmlns:p15="http://schemas.microsoft.com/office/powerpoint/2012/main" xmlns:p14="http://schemas.microsoft.com/office/powerpoint/2010/main" xmlns:com="http://schemas.openxmlformats.org/drawingml/2006/compatibility" xmlns:pvml="urn:schemas-microsoft-com:office:powerpoint" xmlns:v="urn:schemas-microsoft-com:vml" xmlns:o="urn:schemas-microsoft-com:office:office" xmlns:dgm="http://schemas.openxmlformats.org/drawingml/2006/diagram" xmlns:c="http://schemas.openxmlformats.org/drawingml/2006/chart" xmlns:mv="urn:schemas-microsoft-com:mac:vml" xmlns:mc="http://schemas.openxmlformats.org/markup-compatibility/2006" xmlns="" r:id="rId38" roundtripDataSignature="AMtx7mhEk3kr15p5MvOwX8Siehu9UxAE2A=="/>
     </p:ext>
   </p:extLst>
 </p:presentation>
@@ -1583,6 +1583,159 @@
   <p:cSld>
     <p:spTree>
       <p:nvGrpSpPr>
+        <p:cNvPr id="1" name="">
+          <a:extLst>
+            <a:ext uri="{FF2B5EF4-FFF2-40B4-BE49-F238E27FC236}">
+              <a16:creationId xmlns:a16="http://schemas.microsoft.com/office/drawing/2014/main" id="{342573A8-8611-E0E8-8476-34A9A951EE3C}"/>
+            </a:ext>
+          </a:extLst>
+        </p:cNvPr>
+        <p:cNvGrpSpPr/>
+        <p:nvPr/>
+      </p:nvGrpSpPr>
+      <p:grpSpPr>
+        <a:xfrm>
+          <a:off x="0" y="0"/>
+          <a:ext cx="0" cy="0"/>
+          <a:chOff x="0" y="0"/>
+          <a:chExt cx="0" cy="0"/>
+        </a:xfrm>
+      </p:grpSpPr>
+      <p:sp>
+        <p:nvSpPr>
+          <p:cNvPr id="2" name="Slide Image Placeholder 1">
+            <a:extLst>
+              <a:ext uri="{FF2B5EF4-FFF2-40B4-BE49-F238E27FC236}">
+                <a16:creationId xmlns:a16="http://schemas.microsoft.com/office/drawing/2014/main" id="{3A81B671-493B-946B-CB5B-A5ACCAD30BCE}"/>
+              </a:ext>
+            </a:extLst>
+          </p:cNvPr>
+          <p:cNvSpPr>
+            <a:spLocks noGrp="1" noRot="1" noChangeAspect="1"/>
+          </p:cNvSpPr>
+          <p:nvPr>
+            <p:ph type="sldImg"/>
+          </p:nvPr>
+        </p:nvSpPr>
+        <p:spPr/>
+      </p:sp>
+      <p:sp>
+        <p:nvSpPr>
+          <p:cNvPr id="3" name="Notes Placeholder 2">
+            <a:extLst>
+              <a:ext uri="{FF2B5EF4-FFF2-40B4-BE49-F238E27FC236}">
+                <a16:creationId xmlns:a16="http://schemas.microsoft.com/office/drawing/2014/main" id="{3829EE0A-964D-4529-6BB1-6E20EE6ADE9F}"/>
+              </a:ext>
+            </a:extLst>
+          </p:cNvPr>
+          <p:cNvSpPr>
+            <a:spLocks noGrp="1"/>
+          </p:cNvSpPr>
+          <p:nvPr>
+            <p:ph type="body" idx="1"/>
+          </p:nvPr>
+        </p:nvSpPr>
+        <p:spPr/>
+        <p:txBody>
+          <a:bodyPr/>
+          <a:lstStyle/>
+          <a:p>
+            <a:r>
+              <a:rPr lang="en-US" dirty="0"/>
+              <a:t>What is the null hypothesis?</a:t>
+            </a:r>
+          </a:p>
+          <a:p>
+            <a:endParaRPr lang="en-US" dirty="0"/>
+          </a:p>
+          <a:p>
+            <a:r>
+              <a:rPr lang="en-US" dirty="0"/>
+              <a:t>A paired t test is basically the same, but takes into account non-independence between </a:t>
+            </a:r>
+            <a:r>
+              <a:rPr lang="en-US" dirty="0" err="1"/>
+              <a:t>ssamples</a:t>
+            </a:r>
+            <a:r>
+              <a:rPr lang="en-US" dirty="0"/>
+              <a:t>. For example, if it’s the same individual, or siblings, over two time points. </a:t>
+            </a:r>
+          </a:p>
+        </p:txBody>
+      </p:sp>
+      <p:sp>
+        <p:nvSpPr>
+          <p:cNvPr id="4" name="Slide Number Placeholder 3">
+            <a:extLst>
+              <a:ext uri="{FF2B5EF4-FFF2-40B4-BE49-F238E27FC236}">
+                <a16:creationId xmlns:a16="http://schemas.microsoft.com/office/drawing/2014/main" id="{6CA38FCC-4616-80F3-DCD9-2F464658685D}"/>
+              </a:ext>
+            </a:extLst>
+          </p:cNvPr>
+          <p:cNvSpPr>
+            <a:spLocks noGrp="1"/>
+          </p:cNvSpPr>
+          <p:nvPr>
+            <p:ph type="sldNum" idx="12"/>
+          </p:nvPr>
+        </p:nvSpPr>
+        <p:spPr/>
+        <p:txBody>
+          <a:bodyPr/>
+          <a:lstStyle/>
+          <a:p>
+            <a:pPr marL="0" marR="0" lvl="0" indent="0" algn="r" rtl="0">
+              <a:spcBef>
+                <a:spcPts val="0"/>
+              </a:spcBef>
+              <a:spcAft>
+                <a:spcPts val="0"/>
+              </a:spcAft>
+              <a:buNone/>
+            </a:pPr>
+            <a:fld id="{00000000-1234-1234-1234-123412341234}" type="slidenum">
+              <a:rPr lang="en-US" sz="1200" b="0" i="0" u="none" strike="noStrike" cap="none" smtClean="0">
+                <a:solidFill>
+                  <a:schemeClr val="dk1"/>
+                </a:solidFill>
+                <a:latin typeface="Calibri"/>
+                <a:ea typeface="Calibri"/>
+                <a:cs typeface="Calibri"/>
+                <a:sym typeface="Calibri"/>
+              </a:rPr>
+              <a:t>11</a:t>
+            </a:fld>
+            <a:endParaRPr lang="en-US" sz="1200" b="0" i="0" u="none" strike="noStrike" cap="none">
+              <a:solidFill>
+                <a:schemeClr val="dk1"/>
+              </a:solidFill>
+              <a:latin typeface="Calibri"/>
+              <a:ea typeface="Calibri"/>
+              <a:cs typeface="Calibri"/>
+              <a:sym typeface="Calibri"/>
+            </a:endParaRPr>
+          </a:p>
+        </p:txBody>
+      </p:sp>
+    </p:spTree>
+    <p:extLst>
+      <p:ext uri="{BB962C8B-B14F-4D97-AF65-F5344CB8AC3E}">
+        <p14:creationId xmlns:p14="http://schemas.microsoft.com/office/powerpoint/2010/main" val="1829183093"/>
+      </p:ext>
+    </p:extLst>
+  </p:cSld>
+  <p:clrMapOvr>
+    <a:masterClrMapping/>
+  </p:clrMapOvr>
+</p:notes>
+</file>
+
+<file path=ppt/notesSlides/notesSlide11.xml><?xml version="1.0" encoding="utf-8"?>
+<p:notes xmlns:a="http://schemas.openxmlformats.org/drawingml/2006/main" xmlns:r="http://schemas.openxmlformats.org/officeDocument/2006/relationships" xmlns:p="http://schemas.openxmlformats.org/presentationml/2006/main">
+  <p:cSld>
+    <p:spTree>
+      <p:nvGrpSpPr>
         <p:cNvPr id="1" name=""/>
         <p:cNvGrpSpPr/>
         <p:nvPr/>
@@ -1691,6 +1844,126 @@
 </file>
 
 <file path=ppt/notesSlides/notesSlide2.xml><?xml version="1.0" encoding="utf-8"?>
+<p:notes xmlns:a="http://schemas.openxmlformats.org/drawingml/2006/main" xmlns:r="http://schemas.openxmlformats.org/officeDocument/2006/relationships" xmlns:p="http://schemas.openxmlformats.org/presentationml/2006/main">
+  <p:cSld>
+    <p:spTree>
+      <p:nvGrpSpPr>
+        <p:cNvPr id="1" name=""/>
+        <p:cNvGrpSpPr/>
+        <p:nvPr/>
+      </p:nvGrpSpPr>
+      <p:grpSpPr>
+        <a:xfrm>
+          <a:off x="0" y="0"/>
+          <a:ext cx="0" cy="0"/>
+          <a:chOff x="0" y="0"/>
+          <a:chExt cx="0" cy="0"/>
+        </a:xfrm>
+      </p:grpSpPr>
+      <p:sp>
+        <p:nvSpPr>
+          <p:cNvPr id="2" name="Slide Image Placeholder 1"/>
+          <p:cNvSpPr>
+            <a:spLocks noGrp="1" noRot="1" noChangeAspect="1"/>
+          </p:cNvSpPr>
+          <p:nvPr>
+            <p:ph type="sldImg"/>
+          </p:nvPr>
+        </p:nvSpPr>
+        <p:spPr/>
+      </p:sp>
+      <p:sp>
+        <p:nvSpPr>
+          <p:cNvPr id="3" name="Notes Placeholder 2"/>
+          <p:cNvSpPr>
+            <a:spLocks noGrp="1"/>
+          </p:cNvSpPr>
+          <p:nvPr>
+            <p:ph type="body" idx="1"/>
+          </p:nvPr>
+        </p:nvSpPr>
+        <p:spPr/>
+        <p:txBody>
+          <a:bodyPr/>
+          <a:lstStyle/>
+          <a:p>
+            <a:r>
+              <a:rPr lang="en-US" dirty="0"/>
+              <a:t>Let’s go through a little bit of how git works, and how you can do it either through </a:t>
+            </a:r>
+            <a:r>
+              <a:rPr lang="en-US" dirty="0" err="1"/>
+              <a:t>Rstudio</a:t>
+            </a:r>
+            <a:r>
+              <a:rPr lang="en-US" dirty="0"/>
+              <a:t>, or through terminal – switch to sharing your terminal screen!</a:t>
+            </a:r>
+          </a:p>
+        </p:txBody>
+      </p:sp>
+      <p:sp>
+        <p:nvSpPr>
+          <p:cNvPr id="4" name="Slide Number Placeholder 3"/>
+          <p:cNvSpPr>
+            <a:spLocks noGrp="1"/>
+          </p:cNvSpPr>
+          <p:nvPr>
+            <p:ph type="sldNum" idx="12"/>
+          </p:nvPr>
+        </p:nvSpPr>
+        <p:spPr/>
+        <p:txBody>
+          <a:bodyPr/>
+          <a:lstStyle/>
+          <a:p>
+            <a:pPr marL="0" marR="0" lvl="0" indent="0" algn="r" rtl="0">
+              <a:spcBef>
+                <a:spcPts val="0"/>
+              </a:spcBef>
+              <a:spcAft>
+                <a:spcPts val="0"/>
+              </a:spcAft>
+              <a:buNone/>
+            </a:pPr>
+            <a:fld id="{00000000-1234-1234-1234-123412341234}" type="slidenum">
+              <a:rPr lang="en-US" sz="1200" b="0" i="0" u="none" strike="noStrike" cap="none" smtClean="0">
+                <a:solidFill>
+                  <a:schemeClr val="dk1"/>
+                </a:solidFill>
+                <a:latin typeface="Calibri"/>
+                <a:ea typeface="Calibri"/>
+                <a:cs typeface="Calibri"/>
+                <a:sym typeface="Calibri"/>
+              </a:rPr>
+              <a:t>2</a:t>
+            </a:fld>
+            <a:endParaRPr lang="en-US" sz="1200" b="0" i="0" u="none" strike="noStrike" cap="none">
+              <a:solidFill>
+                <a:schemeClr val="dk1"/>
+              </a:solidFill>
+              <a:latin typeface="Calibri"/>
+              <a:ea typeface="Calibri"/>
+              <a:cs typeface="Calibri"/>
+              <a:sym typeface="Calibri"/>
+            </a:endParaRPr>
+          </a:p>
+        </p:txBody>
+      </p:sp>
+    </p:spTree>
+    <p:extLst>
+      <p:ext uri="{BB962C8B-B14F-4D97-AF65-F5344CB8AC3E}">
+        <p14:creationId xmlns:p14="http://schemas.microsoft.com/office/powerpoint/2010/main" val="2306310658"/>
+      </p:ext>
+    </p:extLst>
+  </p:cSld>
+  <p:clrMapOvr>
+    <a:masterClrMapping/>
+  </p:clrMapOvr>
+</p:notes>
+</file>
+
+<file path=ppt/notesSlides/notesSlide3.xml><?xml version="1.0" encoding="utf-8"?>
 <p:notes xmlns:a="http://schemas.openxmlformats.org/drawingml/2006/main" xmlns:r="http://schemas.openxmlformats.org/officeDocument/2006/relationships" xmlns:p="http://schemas.openxmlformats.org/presentationml/2006/main" showMasterSp="0" showMasterPhAnim="0">
   <p:cSld>
     <p:spTree>
@@ -1817,7 +2090,7 @@
 </p:notes>
 </file>
 
-<file path=ppt/notesSlides/notesSlide3.xml><?xml version="1.0" encoding="utf-8"?>
+<file path=ppt/notesSlides/notesSlide4.xml><?xml version="1.0" encoding="utf-8"?>
 <p:notes xmlns:a="http://schemas.openxmlformats.org/drawingml/2006/main" xmlns:r="http://schemas.openxmlformats.org/officeDocument/2006/relationships" xmlns:p="http://schemas.openxmlformats.org/presentationml/2006/main" showMasterSp="0" showMasterPhAnim="0">
   <p:cSld>
     <p:spTree>
@@ -1944,7 +2217,7 @@
 </p:notes>
 </file>
 
-<file path=ppt/notesSlides/notesSlide4.xml><?xml version="1.0" encoding="utf-8"?>
+<file path=ppt/notesSlides/notesSlide5.xml><?xml version="1.0" encoding="utf-8"?>
 <p:notes xmlns:a="http://schemas.openxmlformats.org/drawingml/2006/main" xmlns:r="http://schemas.openxmlformats.org/officeDocument/2006/relationships" xmlns:p="http://schemas.openxmlformats.org/presentationml/2006/main" showMasterSp="0" showMasterPhAnim="0">
   <p:cSld>
     <p:spTree>
@@ -2071,7 +2344,7 @@
 </p:notes>
 </file>
 
-<file path=ppt/notesSlides/notesSlide5.xml><?xml version="1.0" encoding="utf-8"?>
+<file path=ppt/notesSlides/notesSlide6.xml><?xml version="1.0" encoding="utf-8"?>
 <p:notes xmlns:a="http://schemas.openxmlformats.org/drawingml/2006/main" xmlns:r="http://schemas.openxmlformats.org/officeDocument/2006/relationships" xmlns:p="http://schemas.openxmlformats.org/presentationml/2006/main" showMasterSp="0" showMasterPhAnim="0">
   <p:cSld>
     <p:spTree>
@@ -2198,7 +2471,7 @@
 </p:notes>
 </file>
 
-<file path=ppt/notesSlides/notesSlide6.xml><?xml version="1.0" encoding="utf-8"?>
+<file path=ppt/notesSlides/notesSlide7.xml><?xml version="1.0" encoding="utf-8"?>
 <p:notes xmlns:a="http://schemas.openxmlformats.org/drawingml/2006/main" xmlns:r="http://schemas.openxmlformats.org/officeDocument/2006/relationships" xmlns:p="http://schemas.openxmlformats.org/presentationml/2006/main">
   <p:cSld>
     <p:spTree>
@@ -2310,7 +2583,7 @@
 </p:notes>
 </file>
 
-<file path=ppt/notesSlides/notesSlide7.xml><?xml version="1.0" encoding="utf-8"?>
+<file path=ppt/notesSlides/notesSlide8.xml><?xml version="1.0" encoding="utf-8"?>
 <p:notes xmlns:a="http://schemas.openxmlformats.org/drawingml/2006/main" xmlns:r="http://schemas.openxmlformats.org/officeDocument/2006/relationships" xmlns:p="http://schemas.openxmlformats.org/presentationml/2006/main">
   <p:cSld>
     <p:spTree>
@@ -2446,7 +2719,7 @@
 </p:notes>
 </file>
 
-<file path=ppt/notesSlides/notesSlide8.xml><?xml version="1.0" encoding="utf-8"?>
+<file path=ppt/notesSlides/notesSlide9.xml><?xml version="1.0" encoding="utf-8"?>
 <p:notes xmlns:a="http://schemas.openxmlformats.org/drawingml/2006/main" xmlns:r="http://schemas.openxmlformats.org/officeDocument/2006/relationships" xmlns:p="http://schemas.openxmlformats.org/presentationml/2006/main">
   <p:cSld>
     <p:spTree>
@@ -2549,159 +2822,6 @@
     <p:extLst>
       <p:ext uri="{BB962C8B-B14F-4D97-AF65-F5344CB8AC3E}">
         <p14:creationId xmlns:p14="http://schemas.microsoft.com/office/powerpoint/2010/main" val="4112900028"/>
-      </p:ext>
-    </p:extLst>
-  </p:cSld>
-  <p:clrMapOvr>
-    <a:masterClrMapping/>
-  </p:clrMapOvr>
-</p:notes>
-</file>
-
-<file path=ppt/notesSlides/notesSlide9.xml><?xml version="1.0" encoding="utf-8"?>
-<p:notes xmlns:a="http://schemas.openxmlformats.org/drawingml/2006/main" xmlns:r="http://schemas.openxmlformats.org/officeDocument/2006/relationships" xmlns:p="http://schemas.openxmlformats.org/presentationml/2006/main">
-  <p:cSld>
-    <p:spTree>
-      <p:nvGrpSpPr>
-        <p:cNvPr id="1" name="">
-          <a:extLst>
-            <a:ext uri="{FF2B5EF4-FFF2-40B4-BE49-F238E27FC236}">
-              <a16:creationId xmlns:a16="http://schemas.microsoft.com/office/drawing/2014/main" id="{342573A8-8611-E0E8-8476-34A9A951EE3C}"/>
-            </a:ext>
-          </a:extLst>
-        </p:cNvPr>
-        <p:cNvGrpSpPr/>
-        <p:nvPr/>
-      </p:nvGrpSpPr>
-      <p:grpSpPr>
-        <a:xfrm>
-          <a:off x="0" y="0"/>
-          <a:ext cx="0" cy="0"/>
-          <a:chOff x="0" y="0"/>
-          <a:chExt cx="0" cy="0"/>
-        </a:xfrm>
-      </p:grpSpPr>
-      <p:sp>
-        <p:nvSpPr>
-          <p:cNvPr id="2" name="Slide Image Placeholder 1">
-            <a:extLst>
-              <a:ext uri="{FF2B5EF4-FFF2-40B4-BE49-F238E27FC236}">
-                <a16:creationId xmlns:a16="http://schemas.microsoft.com/office/drawing/2014/main" id="{3A81B671-493B-946B-CB5B-A5ACCAD30BCE}"/>
-              </a:ext>
-            </a:extLst>
-          </p:cNvPr>
-          <p:cNvSpPr>
-            <a:spLocks noGrp="1" noRot="1" noChangeAspect="1"/>
-          </p:cNvSpPr>
-          <p:nvPr>
-            <p:ph type="sldImg"/>
-          </p:nvPr>
-        </p:nvSpPr>
-        <p:spPr/>
-      </p:sp>
-      <p:sp>
-        <p:nvSpPr>
-          <p:cNvPr id="3" name="Notes Placeholder 2">
-            <a:extLst>
-              <a:ext uri="{FF2B5EF4-FFF2-40B4-BE49-F238E27FC236}">
-                <a16:creationId xmlns:a16="http://schemas.microsoft.com/office/drawing/2014/main" id="{3829EE0A-964D-4529-6BB1-6E20EE6ADE9F}"/>
-              </a:ext>
-            </a:extLst>
-          </p:cNvPr>
-          <p:cNvSpPr>
-            <a:spLocks noGrp="1"/>
-          </p:cNvSpPr>
-          <p:nvPr>
-            <p:ph type="body" idx="1"/>
-          </p:nvPr>
-        </p:nvSpPr>
-        <p:spPr/>
-        <p:txBody>
-          <a:bodyPr/>
-          <a:lstStyle/>
-          <a:p>
-            <a:r>
-              <a:rPr lang="en-US" dirty="0"/>
-              <a:t>What is the null hypothesis?</a:t>
-            </a:r>
-          </a:p>
-          <a:p>
-            <a:endParaRPr lang="en-US" dirty="0"/>
-          </a:p>
-          <a:p>
-            <a:r>
-              <a:rPr lang="en-US" dirty="0"/>
-              <a:t>A paired t test is basically the same, but takes into account non-independence between </a:t>
-            </a:r>
-            <a:r>
-              <a:rPr lang="en-US" dirty="0" err="1"/>
-              <a:t>ssamples</a:t>
-            </a:r>
-            <a:r>
-              <a:rPr lang="en-US" dirty="0"/>
-              <a:t>. For example, if it’s the same individual, or siblings, over two time points. </a:t>
-            </a:r>
-          </a:p>
-        </p:txBody>
-      </p:sp>
-      <p:sp>
-        <p:nvSpPr>
-          <p:cNvPr id="4" name="Slide Number Placeholder 3">
-            <a:extLst>
-              <a:ext uri="{FF2B5EF4-FFF2-40B4-BE49-F238E27FC236}">
-                <a16:creationId xmlns:a16="http://schemas.microsoft.com/office/drawing/2014/main" id="{6CA38FCC-4616-80F3-DCD9-2F464658685D}"/>
-              </a:ext>
-            </a:extLst>
-          </p:cNvPr>
-          <p:cNvSpPr>
-            <a:spLocks noGrp="1"/>
-          </p:cNvSpPr>
-          <p:nvPr>
-            <p:ph type="sldNum" idx="12"/>
-          </p:nvPr>
-        </p:nvSpPr>
-        <p:spPr/>
-        <p:txBody>
-          <a:bodyPr/>
-          <a:lstStyle/>
-          <a:p>
-            <a:pPr marL="0" marR="0" lvl="0" indent="0" algn="r" rtl="0">
-              <a:spcBef>
-                <a:spcPts val="0"/>
-              </a:spcBef>
-              <a:spcAft>
-                <a:spcPts val="0"/>
-              </a:spcAft>
-              <a:buNone/>
-            </a:pPr>
-            <a:fld id="{00000000-1234-1234-1234-123412341234}" type="slidenum">
-              <a:rPr lang="en-US" sz="1200" b="0" i="0" u="none" strike="noStrike" cap="none" smtClean="0">
-                <a:solidFill>
-                  <a:schemeClr val="dk1"/>
-                </a:solidFill>
-                <a:latin typeface="Calibri"/>
-                <a:ea typeface="Calibri"/>
-                <a:cs typeface="Calibri"/>
-                <a:sym typeface="Calibri"/>
-              </a:rPr>
-              <a:t>11</a:t>
-            </a:fld>
-            <a:endParaRPr lang="en-US" sz="1200" b="0" i="0" u="none" strike="noStrike" cap="none">
-              <a:solidFill>
-                <a:schemeClr val="dk1"/>
-              </a:solidFill>
-              <a:latin typeface="Calibri"/>
-              <a:ea typeface="Calibri"/>
-              <a:cs typeface="Calibri"/>
-              <a:sym typeface="Calibri"/>
-            </a:endParaRPr>
-          </a:p>
-        </p:txBody>
-      </p:sp>
-    </p:spTree>
-    <p:extLst>
-      <p:ext uri="{BB962C8B-B14F-4D97-AF65-F5344CB8AC3E}">
-        <p14:creationId xmlns:p14="http://schemas.microsoft.com/office/powerpoint/2010/main" val="1829183093"/>
       </p:ext>
     </p:extLst>
   </p:cSld>

</xml_diff>